<commit_message>
Update Presentation-2 Group 6 SE_MP_1A.pptx
</commit_message>
<xml_diff>
--- a/Presentation-2 Group 6 SE_MP_1A.pptx
+++ b/Presentation-2 Group 6 SE_MP_1A.pptx
@@ -123,7 +123,7 @@
   </p:defaultTextStyle>
   <p:extLst>
     <p:ext uri="{EFAFB233-063F-42B5-8137-9DF3F51BA10A}">
-      <p15:sldGuideLst xmlns="" xmlns:p15="http://schemas.microsoft.com/office/powerpoint/2012/main">
+      <p15:sldGuideLst xmlns:p15="http://schemas.microsoft.com/office/powerpoint/2012/main" xmlns="">
         <p15:guide id="1" orient="horz" pos="2160" userDrawn="1">
           <p15:clr>
             <a:srgbClr val="A4A3A4"/>
@@ -137,7 +137,7 @@
       </p15:sldGuideLst>
     </p:ext>
     <p:ext uri="{2D200454-40CA-4A62-9FC3-DE9A4176ACB9}">
-      <p15:notesGuideLst xmlns="" xmlns:p15="http://schemas.microsoft.com/office/powerpoint/2012/main"/>
+      <p15:notesGuideLst xmlns:p15="http://schemas.microsoft.com/office/powerpoint/2012/main" xmlns=""/>
     </p:ext>
   </p:extLst>
 </p:presentation>
@@ -2668,6 +2668,13 @@
         </dgm:presLayoutVars>
       </dgm:prSet>
       <dgm:spPr/>
+      <dgm:t>
+        <a:bodyPr/>
+        <a:lstStyle/>
+        <a:p>
+          <a:endParaRPr lang="en-US"/>
+        </a:p>
+      </dgm:t>
     </dgm:pt>
     <dgm:pt modelId="{5AC95B08-1882-41A4-8C44-70E3824024C2}" type="pres">
       <dgm:prSet presAssocID="{E9712896-0703-42AB-9CFE-D8D4673E46A2}" presName="root1" presStyleCnt="0"/>
@@ -2695,10 +2702,24 @@
     <dgm:pt modelId="{BA1F5E39-9D00-459C-9D69-496A86999875}" type="pres">
       <dgm:prSet presAssocID="{1390988B-93A5-4764-97E0-078D8114CC5F}" presName="conn2-1" presStyleLbl="parChTrans1D2" presStyleIdx="0" presStyleCnt="3"/>
       <dgm:spPr/>
+      <dgm:t>
+        <a:bodyPr/>
+        <a:lstStyle/>
+        <a:p>
+          <a:endParaRPr lang="en-US"/>
+        </a:p>
+      </dgm:t>
     </dgm:pt>
     <dgm:pt modelId="{25901A78-977E-4FD6-866A-948B963CFB1F}" type="pres">
       <dgm:prSet presAssocID="{1390988B-93A5-4764-97E0-078D8114CC5F}" presName="connTx" presStyleLbl="parChTrans1D2" presStyleIdx="0" presStyleCnt="3"/>
       <dgm:spPr/>
+      <dgm:t>
+        <a:bodyPr/>
+        <a:lstStyle/>
+        <a:p>
+          <a:endParaRPr lang="en-US"/>
+        </a:p>
+      </dgm:t>
     </dgm:pt>
     <dgm:pt modelId="{0C015DFA-0A47-4DFF-B08F-D53CAC805FE0}" type="pres">
       <dgm:prSet presAssocID="{59904F42-9751-4DD5-9934-68943D84652B}" presName="root2" presStyleCnt="0"/>
@@ -2726,10 +2747,24 @@
     <dgm:pt modelId="{7883D7F5-B7F8-4D60-B28A-42BF48DF674C}" type="pres">
       <dgm:prSet presAssocID="{9B353D5E-9D07-4369-8F99-8ABD67225E7F}" presName="conn2-1" presStyleLbl="parChTrans1D2" presStyleIdx="1" presStyleCnt="3"/>
       <dgm:spPr/>
+      <dgm:t>
+        <a:bodyPr/>
+        <a:lstStyle/>
+        <a:p>
+          <a:endParaRPr lang="en-US"/>
+        </a:p>
+      </dgm:t>
     </dgm:pt>
     <dgm:pt modelId="{A49AD531-17B2-4F83-B4F9-756AA485B769}" type="pres">
       <dgm:prSet presAssocID="{9B353D5E-9D07-4369-8F99-8ABD67225E7F}" presName="connTx" presStyleLbl="parChTrans1D2" presStyleIdx="1" presStyleCnt="3"/>
       <dgm:spPr/>
+      <dgm:t>
+        <a:bodyPr/>
+        <a:lstStyle/>
+        <a:p>
+          <a:endParaRPr lang="en-US"/>
+        </a:p>
+      </dgm:t>
     </dgm:pt>
     <dgm:pt modelId="{48AF6AAF-CF5F-4AF0-8049-44F14EADE20A}" type="pres">
       <dgm:prSet presAssocID="{4EA0B00A-6A6D-47A8-A86E-205353245B6D}" presName="root2" presStyleCnt="0"/>
@@ -2757,10 +2792,24 @@
     <dgm:pt modelId="{D9D0A102-5FE3-480B-862F-196C4EE07994}" type="pres">
       <dgm:prSet presAssocID="{734F144B-901A-4680-9DEC-11E865917D40}" presName="conn2-1" presStyleLbl="parChTrans1D2" presStyleIdx="2" presStyleCnt="3"/>
       <dgm:spPr/>
+      <dgm:t>
+        <a:bodyPr/>
+        <a:lstStyle/>
+        <a:p>
+          <a:endParaRPr lang="en-US"/>
+        </a:p>
+      </dgm:t>
     </dgm:pt>
     <dgm:pt modelId="{0EE5B14B-F795-4970-94D4-A3125D2024A4}" type="pres">
       <dgm:prSet presAssocID="{734F144B-901A-4680-9DEC-11E865917D40}" presName="connTx" presStyleLbl="parChTrans1D2" presStyleIdx="2" presStyleCnt="3"/>
       <dgm:spPr/>
+      <dgm:t>
+        <a:bodyPr/>
+        <a:lstStyle/>
+        <a:p>
+          <a:endParaRPr lang="en-US"/>
+        </a:p>
+      </dgm:t>
     </dgm:pt>
     <dgm:pt modelId="{62C79620-B6BE-44FB-A7B9-444CBB60BECE}" type="pres">
       <dgm:prSet presAssocID="{EDC8BDBB-66B1-421A-931E-8ADE3EA57213}" presName="root2" presStyleCnt="0"/>
@@ -2773,6 +2822,13 @@
         </dgm:presLayoutVars>
       </dgm:prSet>
       <dgm:spPr/>
+      <dgm:t>
+        <a:bodyPr/>
+        <a:lstStyle/>
+        <a:p>
+          <a:endParaRPr lang="en-US"/>
+        </a:p>
+      </dgm:t>
     </dgm:pt>
     <dgm:pt modelId="{C046CBCA-8664-4B23-A445-341CCED39E66}" type="pres">
       <dgm:prSet presAssocID="{EDC8BDBB-66B1-421A-931E-8ADE3EA57213}" presName="level3hierChild" presStyleCnt="0"/>
@@ -3066,6 +3122,13 @@
         </dgm:presLayoutVars>
       </dgm:prSet>
       <dgm:spPr/>
+      <dgm:t>
+        <a:bodyPr/>
+        <a:lstStyle/>
+        <a:p>
+          <a:endParaRPr lang="en-US"/>
+        </a:p>
+      </dgm:t>
     </dgm:pt>
     <dgm:pt modelId="{5AC95B08-1882-41A4-8C44-70E3824024C2}" type="pres">
       <dgm:prSet presAssocID="{E9712896-0703-42AB-9CFE-D8D4673E46A2}" presName="root1" presStyleCnt="0"/>
@@ -3093,10 +3156,24 @@
     <dgm:pt modelId="{35C2EA65-E4C9-49B2-8533-1E2FD7249907}" type="pres">
       <dgm:prSet presAssocID="{9530FE72-2880-47FF-A412-6A41759C654A}" presName="conn2-1" presStyleLbl="parChTrans1D2" presStyleIdx="0" presStyleCnt="3"/>
       <dgm:spPr/>
+      <dgm:t>
+        <a:bodyPr/>
+        <a:lstStyle/>
+        <a:p>
+          <a:endParaRPr lang="en-US"/>
+        </a:p>
+      </dgm:t>
     </dgm:pt>
     <dgm:pt modelId="{3C30FF62-25DA-47DD-B507-F9E6FC9FCB0E}" type="pres">
       <dgm:prSet presAssocID="{9530FE72-2880-47FF-A412-6A41759C654A}" presName="connTx" presStyleLbl="parChTrans1D2" presStyleIdx="0" presStyleCnt="3"/>
       <dgm:spPr/>
+      <dgm:t>
+        <a:bodyPr/>
+        <a:lstStyle/>
+        <a:p>
+          <a:endParaRPr lang="en-US"/>
+        </a:p>
+      </dgm:t>
     </dgm:pt>
     <dgm:pt modelId="{D566B9A1-4742-4DFF-9C30-669C1B1AC278}" type="pres">
       <dgm:prSet presAssocID="{4735A0B8-50E4-418E-B73B-9021B67D0F89}" presName="root2" presStyleCnt="0"/>
@@ -3109,6 +3186,13 @@
         </dgm:presLayoutVars>
       </dgm:prSet>
       <dgm:spPr/>
+      <dgm:t>
+        <a:bodyPr/>
+        <a:lstStyle/>
+        <a:p>
+          <a:endParaRPr lang="en-US"/>
+        </a:p>
+      </dgm:t>
     </dgm:pt>
     <dgm:pt modelId="{E6555669-6D98-488A-B79A-95A50CCC7945}" type="pres">
       <dgm:prSet presAssocID="{4735A0B8-50E4-418E-B73B-9021B67D0F89}" presName="level3hierChild" presStyleCnt="0"/>
@@ -3140,10 +3224,24 @@
     <dgm:pt modelId="{841234B5-0F5F-48D7-A8C4-04E25212457B}" type="pres">
       <dgm:prSet presAssocID="{119D40E0-DA2D-415D-8055-3B58A13CE847}" presName="conn2-1" presStyleLbl="parChTrans1D2" presStyleIdx="1" presStyleCnt="3"/>
       <dgm:spPr/>
+      <dgm:t>
+        <a:bodyPr/>
+        <a:lstStyle/>
+        <a:p>
+          <a:endParaRPr lang="en-US"/>
+        </a:p>
+      </dgm:t>
     </dgm:pt>
     <dgm:pt modelId="{07603804-E049-49B2-B6E8-C56D41DEEFEA}" type="pres">
       <dgm:prSet presAssocID="{119D40E0-DA2D-415D-8055-3B58A13CE847}" presName="connTx" presStyleLbl="parChTrans1D2" presStyleIdx="1" presStyleCnt="3"/>
       <dgm:spPr/>
+      <dgm:t>
+        <a:bodyPr/>
+        <a:lstStyle/>
+        <a:p>
+          <a:endParaRPr lang="en-US"/>
+        </a:p>
+      </dgm:t>
     </dgm:pt>
     <dgm:pt modelId="{32394DEC-83D2-476C-81A2-7B9E9572B171}" type="pres">
       <dgm:prSet presAssocID="{B02B74C8-59A0-4F63-B5AB-76DC1AF478C2}" presName="root2" presStyleCnt="0"/>
@@ -3156,6 +3254,13 @@
         </dgm:presLayoutVars>
       </dgm:prSet>
       <dgm:spPr/>
+      <dgm:t>
+        <a:bodyPr/>
+        <a:lstStyle/>
+        <a:p>
+          <a:endParaRPr lang="en-US"/>
+        </a:p>
+      </dgm:t>
     </dgm:pt>
     <dgm:pt modelId="{1C7D5213-EC29-4190-A44E-0DCDD95CFCBA}" type="pres">
       <dgm:prSet presAssocID="{B02B74C8-59A0-4F63-B5AB-76DC1AF478C2}" presName="level3hierChild" presStyleCnt="0"/>
@@ -3164,10 +3269,24 @@
     <dgm:pt modelId="{99634E2D-88C5-4B28-85A5-F53CDA0CA675}" type="pres">
       <dgm:prSet presAssocID="{A2F3AEBF-7B74-4AAE-B708-1B9A6E30CBB3}" presName="conn2-1" presStyleLbl="parChTrans1D2" presStyleIdx="2" presStyleCnt="3"/>
       <dgm:spPr/>
+      <dgm:t>
+        <a:bodyPr/>
+        <a:lstStyle/>
+        <a:p>
+          <a:endParaRPr lang="en-US"/>
+        </a:p>
+      </dgm:t>
     </dgm:pt>
     <dgm:pt modelId="{3EE99B80-DFA0-4704-88D4-B89B7C695FC8}" type="pres">
       <dgm:prSet presAssocID="{A2F3AEBF-7B74-4AAE-B708-1B9A6E30CBB3}" presName="connTx" presStyleLbl="parChTrans1D2" presStyleIdx="2" presStyleCnt="3"/>
       <dgm:spPr/>
+      <dgm:t>
+        <a:bodyPr/>
+        <a:lstStyle/>
+        <a:p>
+          <a:endParaRPr lang="en-US"/>
+        </a:p>
+      </dgm:t>
     </dgm:pt>
     <dgm:pt modelId="{0E8B0C97-0AF2-432C-823B-974FCF9207DE}" type="pres">
       <dgm:prSet presAssocID="{6D70453E-6CB4-49E7-BAA8-F04868BBD63C}" presName="root2" presStyleCnt="0"/>
@@ -3195,10 +3314,24 @@
     <dgm:pt modelId="{8C5EAD88-7FE4-4EB7-AC61-3C8E64F7F9A7}" type="pres">
       <dgm:prSet presAssocID="{547EABDB-65D0-49AC-8E7D-2FB5A7F32425}" presName="conn2-1" presStyleLbl="parChTrans1D3" presStyleIdx="0" presStyleCnt="1"/>
       <dgm:spPr/>
+      <dgm:t>
+        <a:bodyPr/>
+        <a:lstStyle/>
+        <a:p>
+          <a:endParaRPr lang="en-US"/>
+        </a:p>
+      </dgm:t>
     </dgm:pt>
     <dgm:pt modelId="{4CB55EEA-16E1-4364-8589-44BF6C9F9837}" type="pres">
       <dgm:prSet presAssocID="{547EABDB-65D0-49AC-8E7D-2FB5A7F32425}" presName="connTx" presStyleLbl="parChTrans1D3" presStyleIdx="0" presStyleCnt="1"/>
       <dgm:spPr/>
+      <dgm:t>
+        <a:bodyPr/>
+        <a:lstStyle/>
+        <a:p>
+          <a:endParaRPr lang="en-US"/>
+        </a:p>
+      </dgm:t>
     </dgm:pt>
     <dgm:pt modelId="{B718E86D-7CD9-4965-B83D-31B3829D5629}" type="pres">
       <dgm:prSet presAssocID="{1C526D0A-5A78-4ECE-A5A5-DBA428555290}" presName="root2" presStyleCnt="0"/>
@@ -3225,27 +3358,27 @@
     </dgm:pt>
   </dgm:ptLst>
   <dgm:cxnLst>
+    <dgm:cxn modelId="{3F2DF3BF-D049-46D9-82E3-C22377996D9E}" type="presOf" srcId="{1C526D0A-5A78-4ECE-A5A5-DBA428555290}" destId="{E7598820-BAE7-4D0D-ACDA-7C594E4D8C30}" srcOrd="0" destOrd="0" presId="urn:microsoft.com/office/officeart/2005/8/layout/hierarchy2"/>
+    <dgm:cxn modelId="{EACB5A1E-67E6-48B9-BE4F-5BAE1530ED24}" type="presOf" srcId="{6D70453E-6CB4-49E7-BAA8-F04868BBD63C}" destId="{8CD76EC9-C029-4327-894C-2092E47D1EE2}" srcOrd="0" destOrd="0" presId="urn:microsoft.com/office/officeart/2005/8/layout/hierarchy2"/>
+    <dgm:cxn modelId="{9BB12F8B-4C47-4CD4-B4B9-543D0E068BAF}" type="presOf" srcId="{E9712896-0703-42AB-9CFE-D8D4673E46A2}" destId="{9401C4AB-5096-49AF-8D08-15AA4B3AB741}" srcOrd="0" destOrd="0" presId="urn:microsoft.com/office/officeart/2005/8/layout/hierarchy2"/>
+    <dgm:cxn modelId="{9B46D21F-E87D-4FAC-860E-A4F2DBAFCB96}" type="presOf" srcId="{A2F3AEBF-7B74-4AAE-B708-1B9A6E30CBB3}" destId="{99634E2D-88C5-4B28-85A5-F53CDA0CA675}" srcOrd="0" destOrd="0" presId="urn:microsoft.com/office/officeart/2005/8/layout/hierarchy2"/>
+    <dgm:cxn modelId="{AB93B5AC-0E74-46BB-858F-022089EA8643}" srcId="{153B313B-A70D-425B-931D-390DC9F6995E}" destId="{E9712896-0703-42AB-9CFE-D8D4673E46A2}" srcOrd="0" destOrd="0" parTransId="{5EA95E8B-7260-4E1E-8C81-91929AA99A8B}" sibTransId="{F28A83AD-88E9-42E8-85E0-7EB39EF2400A}"/>
+    <dgm:cxn modelId="{D81648D6-285C-43BB-B0C1-14A72593B455}" type="presOf" srcId="{119D40E0-DA2D-415D-8055-3B58A13CE847}" destId="{841234B5-0F5F-48D7-A8C4-04E25212457B}" srcOrd="0" destOrd="0" presId="urn:microsoft.com/office/officeart/2005/8/layout/hierarchy2"/>
+    <dgm:cxn modelId="{B3C8E34E-67EA-4AD0-8EBA-08A6E5689E1A}" type="presOf" srcId="{9530FE72-2880-47FF-A412-6A41759C654A}" destId="{3C30FF62-25DA-47DD-B507-F9E6FC9FCB0E}" srcOrd="1" destOrd="0" presId="urn:microsoft.com/office/officeart/2005/8/layout/hierarchy2"/>
+    <dgm:cxn modelId="{01052E53-A967-4A84-916E-725229E8E50A}" type="presOf" srcId="{119D40E0-DA2D-415D-8055-3B58A13CE847}" destId="{07603804-E049-49B2-B6E8-C56D41DEEFEA}" srcOrd="1" destOrd="0" presId="urn:microsoft.com/office/officeart/2005/8/layout/hierarchy2"/>
+    <dgm:cxn modelId="{AFD69727-FD46-4B24-8745-6A83A9E933C3}" srcId="{E9712896-0703-42AB-9CFE-D8D4673E46A2}" destId="{4735A0B8-50E4-418E-B73B-9021B67D0F89}" srcOrd="0" destOrd="0" parTransId="{9530FE72-2880-47FF-A412-6A41759C654A}" sibTransId="{A5695D34-99F4-4FD2-B688-916347C73B17}"/>
+    <dgm:cxn modelId="{5EC2BC2D-CBBA-480F-BB89-726CA7D41485}" type="presOf" srcId="{9530FE72-2880-47FF-A412-6A41759C654A}" destId="{35C2EA65-E4C9-49B2-8533-1E2FD7249907}" srcOrd="0" destOrd="0" presId="urn:microsoft.com/office/officeart/2005/8/layout/hierarchy2"/>
+    <dgm:cxn modelId="{B72D4DA5-67C1-4810-902D-D895E9826E51}" type="presOf" srcId="{4735A0B8-50E4-418E-B73B-9021B67D0F89}" destId="{80FDC90D-3D3D-4C0A-B9D1-5B472062BCDA}" srcOrd="0" destOrd="0" presId="urn:microsoft.com/office/officeart/2005/8/layout/hierarchy2"/>
+    <dgm:cxn modelId="{093647B4-EBC8-450C-9D4F-F2D61DBE866C}" srcId="{153B313B-A70D-425B-931D-390DC9F6995E}" destId="{23DEA0ED-4EC9-400F-BBFE-41FA50EBF923}" srcOrd="1" destOrd="0" parTransId="{1D12D435-EEAA-469D-9D92-EB181E9955CE}" sibTransId="{C4CC5A72-27F9-441F-8DA7-FDE5F9D58295}"/>
+    <dgm:cxn modelId="{464F85C9-FCF9-44C8-B5A4-E2C050358ED6}" type="presOf" srcId="{547EABDB-65D0-49AC-8E7D-2FB5A7F32425}" destId="{8C5EAD88-7FE4-4EB7-AC61-3C8E64F7F9A7}" srcOrd="0" destOrd="0" presId="urn:microsoft.com/office/officeart/2005/8/layout/hierarchy2"/>
+    <dgm:cxn modelId="{37990115-4B26-4A53-B6B1-CD6F92F774B5}" srcId="{23DEA0ED-4EC9-400F-BBFE-41FA50EBF923}" destId="{6D70453E-6CB4-49E7-BAA8-F04868BBD63C}" srcOrd="1" destOrd="0" parTransId="{A2F3AEBF-7B74-4AAE-B708-1B9A6E30CBB3}" sibTransId="{6E4543A9-198D-4BBC-AA49-0F429C57E91A}"/>
+    <dgm:cxn modelId="{F9E128EC-388E-4D6C-9889-E892665F4A3A}" srcId="{6D70453E-6CB4-49E7-BAA8-F04868BBD63C}" destId="{1C526D0A-5A78-4ECE-A5A5-DBA428555290}" srcOrd="0" destOrd="0" parTransId="{547EABDB-65D0-49AC-8E7D-2FB5A7F32425}" sibTransId="{9C50B6AE-6428-44E5-8AA5-627E8101DA42}"/>
+    <dgm:cxn modelId="{FEE0C82C-546E-4ED8-AD4E-1DA46EAABEA4}" srcId="{23DEA0ED-4EC9-400F-BBFE-41FA50EBF923}" destId="{B02B74C8-59A0-4F63-B5AB-76DC1AF478C2}" srcOrd="0" destOrd="0" parTransId="{119D40E0-DA2D-415D-8055-3B58A13CE847}" sibTransId="{2ED2ADE6-1064-404D-BC79-4E6BAF60D451}"/>
+    <dgm:cxn modelId="{D7078AF1-7F67-4CB1-8984-8CE787E16A5C}" type="presOf" srcId="{B02B74C8-59A0-4F63-B5AB-76DC1AF478C2}" destId="{8FBE7EC6-B4B8-471C-82C8-EEFB3068D19F}" srcOrd="0" destOrd="0" presId="urn:microsoft.com/office/officeart/2005/8/layout/hierarchy2"/>
     <dgm:cxn modelId="{35ABDF5A-CF75-4A4F-A28F-B3FDC90AAD9A}" type="presOf" srcId="{23DEA0ED-4EC9-400F-BBFE-41FA50EBF923}" destId="{132D1FCC-C949-4D00-800D-6FF3302329F3}" srcOrd="0" destOrd="0" presId="urn:microsoft.com/office/officeart/2005/8/layout/hierarchy2"/>
-    <dgm:cxn modelId="{AFD69727-FD46-4B24-8745-6A83A9E933C3}" srcId="{E9712896-0703-42AB-9CFE-D8D4673E46A2}" destId="{4735A0B8-50E4-418E-B73B-9021B67D0F89}" srcOrd="0" destOrd="0" parTransId="{9530FE72-2880-47FF-A412-6A41759C654A}" sibTransId="{A5695D34-99F4-4FD2-B688-916347C73B17}"/>
-    <dgm:cxn modelId="{3F2DF3BF-D049-46D9-82E3-C22377996D9E}" type="presOf" srcId="{1C526D0A-5A78-4ECE-A5A5-DBA428555290}" destId="{E7598820-BAE7-4D0D-ACDA-7C594E4D8C30}" srcOrd="0" destOrd="0" presId="urn:microsoft.com/office/officeart/2005/8/layout/hierarchy2"/>
-    <dgm:cxn modelId="{FEE0C82C-546E-4ED8-AD4E-1DA46EAABEA4}" srcId="{23DEA0ED-4EC9-400F-BBFE-41FA50EBF923}" destId="{B02B74C8-59A0-4F63-B5AB-76DC1AF478C2}" srcOrd="0" destOrd="0" parTransId="{119D40E0-DA2D-415D-8055-3B58A13CE847}" sibTransId="{2ED2ADE6-1064-404D-BC79-4E6BAF60D451}"/>
+    <dgm:cxn modelId="{5C84D36F-55A9-4652-BD31-62DED4DA7FBC}" type="presOf" srcId="{A2F3AEBF-7B74-4AAE-B708-1B9A6E30CBB3}" destId="{3EE99B80-DFA0-4704-88D4-B89B7C695FC8}" srcOrd="1" destOrd="0" presId="urn:microsoft.com/office/officeart/2005/8/layout/hierarchy2"/>
     <dgm:cxn modelId="{AA234005-0D43-4FCE-B00E-80C1F0ED0EFA}" type="presOf" srcId="{547EABDB-65D0-49AC-8E7D-2FB5A7F32425}" destId="{4CB55EEA-16E1-4364-8589-44BF6C9F9837}" srcOrd="1" destOrd="0" presId="urn:microsoft.com/office/officeart/2005/8/layout/hierarchy2"/>
     <dgm:cxn modelId="{0A91B225-4313-44FF-B3AF-7C9829EB6F29}" type="presOf" srcId="{153B313B-A70D-425B-931D-390DC9F6995E}" destId="{800ACD8B-0234-4F01-9213-B2DE375B40FF}" srcOrd="0" destOrd="0" presId="urn:microsoft.com/office/officeart/2005/8/layout/hierarchy2"/>
-    <dgm:cxn modelId="{9BB12F8B-4C47-4CD4-B4B9-543D0E068BAF}" type="presOf" srcId="{E9712896-0703-42AB-9CFE-D8D4673E46A2}" destId="{9401C4AB-5096-49AF-8D08-15AA4B3AB741}" srcOrd="0" destOrd="0" presId="urn:microsoft.com/office/officeart/2005/8/layout/hierarchy2"/>
-    <dgm:cxn modelId="{37990115-4B26-4A53-B6B1-CD6F92F774B5}" srcId="{23DEA0ED-4EC9-400F-BBFE-41FA50EBF923}" destId="{6D70453E-6CB4-49E7-BAA8-F04868BBD63C}" srcOrd="1" destOrd="0" parTransId="{A2F3AEBF-7B74-4AAE-B708-1B9A6E30CBB3}" sibTransId="{6E4543A9-198D-4BBC-AA49-0F429C57E91A}"/>
-    <dgm:cxn modelId="{EACB5A1E-67E6-48B9-BE4F-5BAE1530ED24}" type="presOf" srcId="{6D70453E-6CB4-49E7-BAA8-F04868BBD63C}" destId="{8CD76EC9-C029-4327-894C-2092E47D1EE2}" srcOrd="0" destOrd="0" presId="urn:microsoft.com/office/officeart/2005/8/layout/hierarchy2"/>
-    <dgm:cxn modelId="{5EC2BC2D-CBBA-480F-BB89-726CA7D41485}" type="presOf" srcId="{9530FE72-2880-47FF-A412-6A41759C654A}" destId="{35C2EA65-E4C9-49B2-8533-1E2FD7249907}" srcOrd="0" destOrd="0" presId="urn:microsoft.com/office/officeart/2005/8/layout/hierarchy2"/>
-    <dgm:cxn modelId="{464F85C9-FCF9-44C8-B5A4-E2C050358ED6}" type="presOf" srcId="{547EABDB-65D0-49AC-8E7D-2FB5A7F32425}" destId="{8C5EAD88-7FE4-4EB7-AC61-3C8E64F7F9A7}" srcOrd="0" destOrd="0" presId="urn:microsoft.com/office/officeart/2005/8/layout/hierarchy2"/>
-    <dgm:cxn modelId="{B72D4DA5-67C1-4810-902D-D895E9826E51}" type="presOf" srcId="{4735A0B8-50E4-418E-B73B-9021B67D0F89}" destId="{80FDC90D-3D3D-4C0A-B9D1-5B472062BCDA}" srcOrd="0" destOrd="0" presId="urn:microsoft.com/office/officeart/2005/8/layout/hierarchy2"/>
-    <dgm:cxn modelId="{9B46D21F-E87D-4FAC-860E-A4F2DBAFCB96}" type="presOf" srcId="{A2F3AEBF-7B74-4AAE-B708-1B9A6E30CBB3}" destId="{99634E2D-88C5-4B28-85A5-F53CDA0CA675}" srcOrd="0" destOrd="0" presId="urn:microsoft.com/office/officeart/2005/8/layout/hierarchy2"/>
-    <dgm:cxn modelId="{D81648D6-285C-43BB-B0C1-14A72593B455}" type="presOf" srcId="{119D40E0-DA2D-415D-8055-3B58A13CE847}" destId="{841234B5-0F5F-48D7-A8C4-04E25212457B}" srcOrd="0" destOrd="0" presId="urn:microsoft.com/office/officeart/2005/8/layout/hierarchy2"/>
-    <dgm:cxn modelId="{B3C8E34E-67EA-4AD0-8EBA-08A6E5689E1A}" type="presOf" srcId="{9530FE72-2880-47FF-A412-6A41759C654A}" destId="{3C30FF62-25DA-47DD-B507-F9E6FC9FCB0E}" srcOrd="1" destOrd="0" presId="urn:microsoft.com/office/officeart/2005/8/layout/hierarchy2"/>
-    <dgm:cxn modelId="{5C84D36F-55A9-4652-BD31-62DED4DA7FBC}" type="presOf" srcId="{A2F3AEBF-7B74-4AAE-B708-1B9A6E30CBB3}" destId="{3EE99B80-DFA0-4704-88D4-B89B7C695FC8}" srcOrd="1" destOrd="0" presId="urn:microsoft.com/office/officeart/2005/8/layout/hierarchy2"/>
-    <dgm:cxn modelId="{AB93B5AC-0E74-46BB-858F-022089EA8643}" srcId="{153B313B-A70D-425B-931D-390DC9F6995E}" destId="{E9712896-0703-42AB-9CFE-D8D4673E46A2}" srcOrd="0" destOrd="0" parTransId="{5EA95E8B-7260-4E1E-8C81-91929AA99A8B}" sibTransId="{F28A83AD-88E9-42E8-85E0-7EB39EF2400A}"/>
-    <dgm:cxn modelId="{D7078AF1-7F67-4CB1-8984-8CE787E16A5C}" type="presOf" srcId="{B02B74C8-59A0-4F63-B5AB-76DC1AF478C2}" destId="{8FBE7EC6-B4B8-471C-82C8-EEFB3068D19F}" srcOrd="0" destOrd="0" presId="urn:microsoft.com/office/officeart/2005/8/layout/hierarchy2"/>
-    <dgm:cxn modelId="{093647B4-EBC8-450C-9D4F-F2D61DBE866C}" srcId="{153B313B-A70D-425B-931D-390DC9F6995E}" destId="{23DEA0ED-4EC9-400F-BBFE-41FA50EBF923}" srcOrd="1" destOrd="0" parTransId="{1D12D435-EEAA-469D-9D92-EB181E9955CE}" sibTransId="{C4CC5A72-27F9-441F-8DA7-FDE5F9D58295}"/>
-    <dgm:cxn modelId="{01052E53-A967-4A84-916E-725229E8E50A}" type="presOf" srcId="{119D40E0-DA2D-415D-8055-3B58A13CE847}" destId="{07603804-E049-49B2-B6E8-C56D41DEEFEA}" srcOrd="1" destOrd="0" presId="urn:microsoft.com/office/officeart/2005/8/layout/hierarchy2"/>
-    <dgm:cxn modelId="{F9E128EC-388E-4D6C-9889-E892665F4A3A}" srcId="{6D70453E-6CB4-49E7-BAA8-F04868BBD63C}" destId="{1C526D0A-5A78-4ECE-A5A5-DBA428555290}" srcOrd="0" destOrd="0" parTransId="{547EABDB-65D0-49AC-8E7D-2FB5A7F32425}" sibTransId="{9C50B6AE-6428-44E5-8AA5-627E8101DA42}"/>
     <dgm:cxn modelId="{3303513F-78DD-4A04-B675-93C682633F14}" type="presParOf" srcId="{800ACD8B-0234-4F01-9213-B2DE375B40FF}" destId="{5AC95B08-1882-41A4-8C44-70E3824024C2}" srcOrd="0" destOrd="0" presId="urn:microsoft.com/office/officeart/2005/8/layout/hierarchy2"/>
     <dgm:cxn modelId="{F39A9336-3051-4611-B458-7CAE25DD1130}" type="presParOf" srcId="{5AC95B08-1882-41A4-8C44-70E3824024C2}" destId="{9401C4AB-5096-49AF-8D08-15AA4B3AB741}" srcOrd="0" destOrd="0" presId="urn:microsoft.com/office/officeart/2005/8/layout/hierarchy2"/>
     <dgm:cxn modelId="{E0648D2A-F2DA-46F1-8952-94F7133A68F8}" type="presParOf" srcId="{5AC95B08-1882-41A4-8C44-70E3824024C2}" destId="{10DAC478-AA50-47F5-9735-64BE57164A55}" srcOrd="1" destOrd="0" presId="urn:microsoft.com/office/officeart/2005/8/layout/hierarchy2"/>
@@ -3414,6 +3547,13 @@
         </dgm:presLayoutVars>
       </dgm:prSet>
       <dgm:spPr/>
+      <dgm:t>
+        <a:bodyPr/>
+        <a:lstStyle/>
+        <a:p>
+          <a:endParaRPr lang="en-US"/>
+        </a:p>
+      </dgm:t>
     </dgm:pt>
     <dgm:pt modelId="{5AC95B08-1882-41A4-8C44-70E3824024C2}" type="pres">
       <dgm:prSet presAssocID="{E9712896-0703-42AB-9CFE-D8D4673E46A2}" presName="root1" presStyleCnt="0"/>
@@ -3441,10 +3581,24 @@
     <dgm:pt modelId="{75CF0755-6E06-4C3D-B777-30E620A99F01}" type="pres">
       <dgm:prSet presAssocID="{ABD2DCD2-1E46-4EB3-98BE-E69D5C378ED2}" presName="conn2-1" presStyleLbl="parChTrans1D2" presStyleIdx="0" presStyleCnt="2"/>
       <dgm:spPr/>
+      <dgm:t>
+        <a:bodyPr/>
+        <a:lstStyle/>
+        <a:p>
+          <a:endParaRPr lang="en-US"/>
+        </a:p>
+      </dgm:t>
     </dgm:pt>
     <dgm:pt modelId="{D5AC0EC5-005A-4A68-96C0-1DD562E0547B}" type="pres">
       <dgm:prSet presAssocID="{ABD2DCD2-1E46-4EB3-98BE-E69D5C378ED2}" presName="connTx" presStyleLbl="parChTrans1D2" presStyleIdx="0" presStyleCnt="2"/>
       <dgm:spPr/>
+      <dgm:t>
+        <a:bodyPr/>
+        <a:lstStyle/>
+        <a:p>
+          <a:endParaRPr lang="en-US"/>
+        </a:p>
+      </dgm:t>
     </dgm:pt>
     <dgm:pt modelId="{2C9A2FC9-96ED-4A59-BAB8-13D9CFEB4CEC}" type="pres">
       <dgm:prSet presAssocID="{0760C5F7-F8C4-4FA8-B216-425B3338596C}" presName="root2" presStyleCnt="0"/>
@@ -3457,6 +3611,13 @@
         </dgm:presLayoutVars>
       </dgm:prSet>
       <dgm:spPr/>
+      <dgm:t>
+        <a:bodyPr/>
+        <a:lstStyle/>
+        <a:p>
+          <a:endParaRPr lang="en-US"/>
+        </a:p>
+      </dgm:t>
     </dgm:pt>
     <dgm:pt modelId="{4133CBFF-78AD-4AF7-968B-A3A2C8D21245}" type="pres">
       <dgm:prSet presAssocID="{0760C5F7-F8C4-4FA8-B216-425B3338596C}" presName="level3hierChild" presStyleCnt="0"/>
@@ -3465,10 +3626,24 @@
     <dgm:pt modelId="{8B129A86-6704-4E98-87BD-3FB05B257C9D}" type="pres">
       <dgm:prSet presAssocID="{74150182-AA64-4ACF-877B-86BC64AFA5E1}" presName="conn2-1" presStyleLbl="parChTrans1D2" presStyleIdx="1" presStyleCnt="2"/>
       <dgm:spPr/>
+      <dgm:t>
+        <a:bodyPr/>
+        <a:lstStyle/>
+        <a:p>
+          <a:endParaRPr lang="en-US"/>
+        </a:p>
+      </dgm:t>
     </dgm:pt>
     <dgm:pt modelId="{33A16003-1294-4B0B-A9B8-AE5416914E7F}" type="pres">
       <dgm:prSet presAssocID="{74150182-AA64-4ACF-877B-86BC64AFA5E1}" presName="connTx" presStyleLbl="parChTrans1D2" presStyleIdx="1" presStyleCnt="2"/>
       <dgm:spPr/>
+      <dgm:t>
+        <a:bodyPr/>
+        <a:lstStyle/>
+        <a:p>
+          <a:endParaRPr lang="en-US"/>
+        </a:p>
+      </dgm:t>
     </dgm:pt>
     <dgm:pt modelId="{FD4DE95F-37FB-4ED4-8E74-2CF8B8AB5D91}" type="pres">
       <dgm:prSet presAssocID="{1776F6E5-1557-41B5-B0C3-B7D0DD0C5FA9}" presName="root2" presStyleCnt="0"/>
@@ -3481,6 +3656,13 @@
         </dgm:presLayoutVars>
       </dgm:prSet>
       <dgm:spPr/>
+      <dgm:t>
+        <a:bodyPr/>
+        <a:lstStyle/>
+        <a:p>
+          <a:endParaRPr lang="en-US"/>
+        </a:p>
+      </dgm:t>
     </dgm:pt>
     <dgm:pt modelId="{7973CB09-5A46-4E00-A04D-C200D4D12475}" type="pres">
       <dgm:prSet presAssocID="{1776F6E5-1557-41B5-B0C3-B7D0DD0C5FA9}" presName="level3hierChild" presStyleCnt="0"/>
@@ -3488,17 +3670,17 @@
     </dgm:pt>
   </dgm:ptLst>
   <dgm:cxnLst>
+    <dgm:cxn modelId="{51129DF1-FCA8-4251-9FD6-B66B9208633E}" srcId="{E9712896-0703-42AB-9CFE-D8D4673E46A2}" destId="{0760C5F7-F8C4-4FA8-B216-425B3338596C}" srcOrd="0" destOrd="0" parTransId="{ABD2DCD2-1E46-4EB3-98BE-E69D5C378ED2}" sibTransId="{1EB9AD1A-0A78-4100-AFFE-1B32B8776FB7}"/>
+    <dgm:cxn modelId="{749639B4-99C1-4904-89B5-1283F31D5EAD}" type="presOf" srcId="{E9712896-0703-42AB-9CFE-D8D4673E46A2}" destId="{9401C4AB-5096-49AF-8D08-15AA4B3AB741}" srcOrd="0" destOrd="0" presId="urn:microsoft.com/office/officeart/2005/8/layout/hierarchy2"/>
+    <dgm:cxn modelId="{616CF5D1-1E74-4A92-B674-6422DBEB833B}" type="presOf" srcId="{1776F6E5-1557-41B5-B0C3-B7D0DD0C5FA9}" destId="{F53F6FB1-8B6B-4698-B0AA-2A909011C6C9}" srcOrd="0" destOrd="0" presId="urn:microsoft.com/office/officeart/2005/8/layout/hierarchy2"/>
+    <dgm:cxn modelId="{AB93B5AC-0E74-46BB-858F-022089EA8643}" srcId="{153B313B-A70D-425B-931D-390DC9F6995E}" destId="{E9712896-0703-42AB-9CFE-D8D4673E46A2}" srcOrd="0" destOrd="0" parTransId="{5EA95E8B-7260-4E1E-8C81-91929AA99A8B}" sibTransId="{F28A83AD-88E9-42E8-85E0-7EB39EF2400A}"/>
+    <dgm:cxn modelId="{A850B96C-07E1-4666-8DD9-6F2AC3298F79}" type="presOf" srcId="{ABD2DCD2-1E46-4EB3-98BE-E69D5C378ED2}" destId="{D5AC0EC5-005A-4A68-96C0-1DD562E0547B}" srcOrd="1" destOrd="0" presId="urn:microsoft.com/office/officeart/2005/8/layout/hierarchy2"/>
+    <dgm:cxn modelId="{17C4C58D-9D6F-407A-A4BA-4615B9E08149}" type="presOf" srcId="{ABD2DCD2-1E46-4EB3-98BE-E69D5C378ED2}" destId="{75CF0755-6E06-4C3D-B777-30E620A99F01}" srcOrd="0" destOrd="0" presId="urn:microsoft.com/office/officeart/2005/8/layout/hierarchy2"/>
     <dgm:cxn modelId="{FDAC0148-8633-4546-BD52-C27E66B0694B}" type="presOf" srcId="{0760C5F7-F8C4-4FA8-B216-425B3338596C}" destId="{35549AE0-7FE5-49F5-8EFF-C0AD6CE17D15}" srcOrd="0" destOrd="0" presId="urn:microsoft.com/office/officeart/2005/8/layout/hierarchy2"/>
+    <dgm:cxn modelId="{CBAE36BF-094A-4B23-AC48-6D5F0BD0E9A5}" type="presOf" srcId="{153B313B-A70D-425B-931D-390DC9F6995E}" destId="{800ACD8B-0234-4F01-9213-B2DE375B40FF}" srcOrd="0" destOrd="0" presId="urn:microsoft.com/office/officeart/2005/8/layout/hierarchy2"/>
+    <dgm:cxn modelId="{FDFA52D5-FACE-4D61-B5A4-16678CAC30C0}" type="presOf" srcId="{74150182-AA64-4ACF-877B-86BC64AFA5E1}" destId="{33A16003-1294-4B0B-A9B8-AE5416914E7F}" srcOrd="1" destOrd="0" presId="urn:microsoft.com/office/officeart/2005/8/layout/hierarchy2"/>
+    <dgm:cxn modelId="{FE5A2C3E-0981-4272-8E9A-408DA4133230}" type="presOf" srcId="{74150182-AA64-4ACF-877B-86BC64AFA5E1}" destId="{8B129A86-6704-4E98-87BD-3FB05B257C9D}" srcOrd="0" destOrd="0" presId="urn:microsoft.com/office/officeart/2005/8/layout/hierarchy2"/>
     <dgm:cxn modelId="{DEB6745C-F6D1-4A9A-99B9-CA9BDCC39C1E}" srcId="{E9712896-0703-42AB-9CFE-D8D4673E46A2}" destId="{1776F6E5-1557-41B5-B0C3-B7D0DD0C5FA9}" srcOrd="1" destOrd="0" parTransId="{74150182-AA64-4ACF-877B-86BC64AFA5E1}" sibTransId="{2E8BE890-6DB1-41F9-8489-062511B4DD49}"/>
-    <dgm:cxn modelId="{FDFA52D5-FACE-4D61-B5A4-16678CAC30C0}" type="presOf" srcId="{74150182-AA64-4ACF-877B-86BC64AFA5E1}" destId="{33A16003-1294-4B0B-A9B8-AE5416914E7F}" srcOrd="1" destOrd="0" presId="urn:microsoft.com/office/officeart/2005/8/layout/hierarchy2"/>
-    <dgm:cxn modelId="{CBAE36BF-094A-4B23-AC48-6D5F0BD0E9A5}" type="presOf" srcId="{153B313B-A70D-425B-931D-390DC9F6995E}" destId="{800ACD8B-0234-4F01-9213-B2DE375B40FF}" srcOrd="0" destOrd="0" presId="urn:microsoft.com/office/officeart/2005/8/layout/hierarchy2"/>
-    <dgm:cxn modelId="{FE5A2C3E-0981-4272-8E9A-408DA4133230}" type="presOf" srcId="{74150182-AA64-4ACF-877B-86BC64AFA5E1}" destId="{8B129A86-6704-4E98-87BD-3FB05B257C9D}" srcOrd="0" destOrd="0" presId="urn:microsoft.com/office/officeart/2005/8/layout/hierarchy2"/>
-    <dgm:cxn modelId="{AB93B5AC-0E74-46BB-858F-022089EA8643}" srcId="{153B313B-A70D-425B-931D-390DC9F6995E}" destId="{E9712896-0703-42AB-9CFE-D8D4673E46A2}" srcOrd="0" destOrd="0" parTransId="{5EA95E8B-7260-4E1E-8C81-91929AA99A8B}" sibTransId="{F28A83AD-88E9-42E8-85E0-7EB39EF2400A}"/>
-    <dgm:cxn modelId="{51129DF1-FCA8-4251-9FD6-B66B9208633E}" srcId="{E9712896-0703-42AB-9CFE-D8D4673E46A2}" destId="{0760C5F7-F8C4-4FA8-B216-425B3338596C}" srcOrd="0" destOrd="0" parTransId="{ABD2DCD2-1E46-4EB3-98BE-E69D5C378ED2}" sibTransId="{1EB9AD1A-0A78-4100-AFFE-1B32B8776FB7}"/>
-    <dgm:cxn modelId="{A850B96C-07E1-4666-8DD9-6F2AC3298F79}" type="presOf" srcId="{ABD2DCD2-1E46-4EB3-98BE-E69D5C378ED2}" destId="{D5AC0EC5-005A-4A68-96C0-1DD562E0547B}" srcOrd="1" destOrd="0" presId="urn:microsoft.com/office/officeart/2005/8/layout/hierarchy2"/>
-    <dgm:cxn modelId="{749639B4-99C1-4904-89B5-1283F31D5EAD}" type="presOf" srcId="{E9712896-0703-42AB-9CFE-D8D4673E46A2}" destId="{9401C4AB-5096-49AF-8D08-15AA4B3AB741}" srcOrd="0" destOrd="0" presId="urn:microsoft.com/office/officeart/2005/8/layout/hierarchy2"/>
-    <dgm:cxn modelId="{17C4C58D-9D6F-407A-A4BA-4615B9E08149}" type="presOf" srcId="{ABD2DCD2-1E46-4EB3-98BE-E69D5C378ED2}" destId="{75CF0755-6E06-4C3D-B777-30E620A99F01}" srcOrd="0" destOrd="0" presId="urn:microsoft.com/office/officeart/2005/8/layout/hierarchy2"/>
-    <dgm:cxn modelId="{616CF5D1-1E74-4A92-B674-6422DBEB833B}" type="presOf" srcId="{1776F6E5-1557-41B5-B0C3-B7D0DD0C5FA9}" destId="{F53F6FB1-8B6B-4698-B0AA-2A909011C6C9}" srcOrd="0" destOrd="0" presId="urn:microsoft.com/office/officeart/2005/8/layout/hierarchy2"/>
     <dgm:cxn modelId="{20694C94-FB88-4285-BD10-B163FB93E087}" type="presParOf" srcId="{800ACD8B-0234-4F01-9213-B2DE375B40FF}" destId="{5AC95B08-1882-41A4-8C44-70E3824024C2}" srcOrd="0" destOrd="0" presId="urn:microsoft.com/office/officeart/2005/8/layout/hierarchy2"/>
     <dgm:cxn modelId="{83679CAD-0F23-4BDB-B64D-7B05A8E03C5A}" type="presParOf" srcId="{5AC95B08-1882-41A4-8C44-70E3824024C2}" destId="{9401C4AB-5096-49AF-8D08-15AA4B3AB741}" srcOrd="0" destOrd="0" presId="urn:microsoft.com/office/officeart/2005/8/layout/hierarchy2"/>
     <dgm:cxn modelId="{284BE162-8439-4EE4-9801-8E1F70617B00}" type="presParOf" srcId="{5AC95B08-1882-41A4-8C44-70E3824024C2}" destId="{10DAC478-AA50-47F5-9735-64BE57164A55}" srcOrd="1" destOrd="0" presId="urn:microsoft.com/office/officeart/2005/8/layout/hierarchy2"/>
@@ -7739,7 +7921,7 @@
     </p:spTree>
     <p:extLst>
       <p:ext uri="{BB962C8B-B14F-4D97-AF65-F5344CB8AC3E}">
-        <p14:creationId xmlns="" xmlns:p14="http://schemas.microsoft.com/office/powerpoint/2010/main" val="1830255166"/>
+        <p14:creationId xmlns:p14="http://schemas.microsoft.com/office/powerpoint/2010/main" xmlns="" val="1830255166"/>
       </p:ext>
     </p:extLst>
   </p:cSld>
@@ -7998,7 +8180,7 @@
     </p:spTree>
     <p:extLst>
       <p:ext uri="{BB962C8B-B14F-4D97-AF65-F5344CB8AC3E}">
-        <p14:creationId xmlns="" xmlns:p14="http://schemas.microsoft.com/office/powerpoint/2010/main" val="3381910297"/>
+        <p14:creationId xmlns:p14="http://schemas.microsoft.com/office/powerpoint/2010/main" xmlns="" val="3381910297"/>
       </p:ext>
     </p:extLst>
   </p:cSld>
@@ -8178,7 +8360,7 @@
     </p:spTree>
     <p:extLst>
       <p:ext uri="{BB962C8B-B14F-4D97-AF65-F5344CB8AC3E}">
-        <p14:creationId xmlns="" xmlns:p14="http://schemas.microsoft.com/office/powerpoint/2010/main" val="1011769815"/>
+        <p14:creationId xmlns:p14="http://schemas.microsoft.com/office/powerpoint/2010/main" xmlns="" val="1011769815"/>
       </p:ext>
     </p:extLst>
   </p:cSld>
@@ -8276,7 +8458,7 @@
     </p:spTree>
     <p:extLst>
       <p:ext uri="{BB962C8B-B14F-4D97-AF65-F5344CB8AC3E}">
-        <p14:creationId xmlns="" xmlns:p14="http://schemas.microsoft.com/office/powerpoint/2010/main" val="3421780843"/>
+        <p14:creationId xmlns:p14="http://schemas.microsoft.com/office/powerpoint/2010/main" xmlns="" val="3421780843"/>
       </p:ext>
     </p:extLst>
   </p:cSld>
@@ -8308,7 +8490,7 @@
           <p:cNvPr id="2" name="Title 1">
             <a:extLst>
               <a:ext uri="{FF2B5EF4-FFF2-40B4-BE49-F238E27FC236}">
-                <a16:creationId xmlns="" xmlns:a16="http://schemas.microsoft.com/office/drawing/2014/main" id="{822F6299-4697-4703-B18F-AC974C1B0086}"/>
+                <a16:creationId xmlns:a16="http://schemas.microsoft.com/office/drawing/2014/main" xmlns="" id="{822F6299-4697-4703-B18F-AC974C1B0086}"/>
               </a:ext>
             </a:extLst>
           </p:cNvPr>
@@ -8346,7 +8528,7 @@
           <p:cNvPr id="3" name="Subtitle 2">
             <a:extLst>
               <a:ext uri="{FF2B5EF4-FFF2-40B4-BE49-F238E27FC236}">
-                <a16:creationId xmlns="" xmlns:a16="http://schemas.microsoft.com/office/drawing/2014/main" id="{7A47C4DB-A1B2-4DD7-82C7-DE2A82A9ACC1}"/>
+                <a16:creationId xmlns:a16="http://schemas.microsoft.com/office/drawing/2014/main" xmlns="" id="{7A47C4DB-A1B2-4DD7-82C7-DE2A82A9ACC1}"/>
               </a:ext>
             </a:extLst>
           </p:cNvPr>
@@ -8417,7 +8599,7 @@
           <p:cNvPr id="4" name="Date Placeholder 3">
             <a:extLst>
               <a:ext uri="{FF2B5EF4-FFF2-40B4-BE49-F238E27FC236}">
-                <a16:creationId xmlns="" xmlns:a16="http://schemas.microsoft.com/office/drawing/2014/main" id="{73827125-DCF5-4A0D-B159-6FB758063B2B}"/>
+                <a16:creationId xmlns:a16="http://schemas.microsoft.com/office/drawing/2014/main" xmlns="" id="{73827125-DCF5-4A0D-B159-6FB758063B2B}"/>
               </a:ext>
             </a:extLst>
           </p:cNvPr>
@@ -8447,7 +8629,7 @@
           <p:cNvPr id="5" name="Footer Placeholder 4">
             <a:extLst>
               <a:ext uri="{FF2B5EF4-FFF2-40B4-BE49-F238E27FC236}">
-                <a16:creationId xmlns="" xmlns:a16="http://schemas.microsoft.com/office/drawing/2014/main" id="{CC925FE3-6E29-4374-9C5E-388FA6860463}"/>
+                <a16:creationId xmlns:a16="http://schemas.microsoft.com/office/drawing/2014/main" xmlns="" id="{CC925FE3-6E29-4374-9C5E-388FA6860463}"/>
               </a:ext>
             </a:extLst>
           </p:cNvPr>
@@ -8472,7 +8654,7 @@
           <p:cNvPr id="6" name="Slide Number Placeholder 5">
             <a:extLst>
               <a:ext uri="{FF2B5EF4-FFF2-40B4-BE49-F238E27FC236}">
-                <a16:creationId xmlns="" xmlns:a16="http://schemas.microsoft.com/office/drawing/2014/main" id="{6B051202-6815-4D56-9234-D73B3F86070D}"/>
+                <a16:creationId xmlns:a16="http://schemas.microsoft.com/office/drawing/2014/main" xmlns="" id="{6B051202-6815-4D56-9234-D73B3F86070D}"/>
               </a:ext>
             </a:extLst>
           </p:cNvPr>
@@ -8500,7 +8682,7 @@
     </p:spTree>
     <p:extLst>
       <p:ext uri="{BB962C8B-B14F-4D97-AF65-F5344CB8AC3E}">
-        <p14:creationId xmlns="" xmlns:p14="http://schemas.microsoft.com/office/powerpoint/2010/main" val="1113617419"/>
+        <p14:creationId xmlns:p14="http://schemas.microsoft.com/office/powerpoint/2010/main" xmlns="" val="1113617419"/>
       </p:ext>
     </p:extLst>
   </p:cSld>
@@ -8532,7 +8714,7 @@
           <p:cNvPr id="2" name="Title 1">
             <a:extLst>
               <a:ext uri="{FF2B5EF4-FFF2-40B4-BE49-F238E27FC236}">
-                <a16:creationId xmlns="" xmlns:a16="http://schemas.microsoft.com/office/drawing/2014/main" id="{0804A084-3AE0-40A4-8735-BAB5C30BDB64}"/>
+                <a16:creationId xmlns:a16="http://schemas.microsoft.com/office/drawing/2014/main" xmlns="" id="{0804A084-3AE0-40A4-8735-BAB5C30BDB64}"/>
               </a:ext>
             </a:extLst>
           </p:cNvPr>
@@ -8561,7 +8743,7 @@
           <p:cNvPr id="3" name="Vertical Text Placeholder 2">
             <a:extLst>
               <a:ext uri="{FF2B5EF4-FFF2-40B4-BE49-F238E27FC236}">
-                <a16:creationId xmlns="" xmlns:a16="http://schemas.microsoft.com/office/drawing/2014/main" id="{9AF191ED-2D86-4AD9-A9B1-A8FD97254282}"/>
+                <a16:creationId xmlns:a16="http://schemas.microsoft.com/office/drawing/2014/main" xmlns="" id="{9AF191ED-2D86-4AD9-A9B1-A8FD97254282}"/>
               </a:ext>
             </a:extLst>
           </p:cNvPr>
@@ -8619,7 +8801,7 @@
           <p:cNvPr id="4" name="Date Placeholder 3">
             <a:extLst>
               <a:ext uri="{FF2B5EF4-FFF2-40B4-BE49-F238E27FC236}">
-                <a16:creationId xmlns="" xmlns:a16="http://schemas.microsoft.com/office/drawing/2014/main" id="{0F5C659D-5578-457E-9045-1AFE33CD09E3}"/>
+                <a16:creationId xmlns:a16="http://schemas.microsoft.com/office/drawing/2014/main" xmlns="" id="{0F5C659D-5578-457E-9045-1AFE33CD09E3}"/>
               </a:ext>
             </a:extLst>
           </p:cNvPr>
@@ -8649,7 +8831,7 @@
           <p:cNvPr id="5" name="Footer Placeholder 4">
             <a:extLst>
               <a:ext uri="{FF2B5EF4-FFF2-40B4-BE49-F238E27FC236}">
-                <a16:creationId xmlns="" xmlns:a16="http://schemas.microsoft.com/office/drawing/2014/main" id="{3C41B8EA-2C68-46F9-9977-058EC6F05002}"/>
+                <a16:creationId xmlns:a16="http://schemas.microsoft.com/office/drawing/2014/main" xmlns="" id="{3C41B8EA-2C68-46F9-9977-058EC6F05002}"/>
               </a:ext>
             </a:extLst>
           </p:cNvPr>
@@ -8674,7 +8856,7 @@
           <p:cNvPr id="6" name="Slide Number Placeholder 5">
             <a:extLst>
               <a:ext uri="{FF2B5EF4-FFF2-40B4-BE49-F238E27FC236}">
-                <a16:creationId xmlns="" xmlns:a16="http://schemas.microsoft.com/office/drawing/2014/main" id="{560A813A-CCBE-4B3A-BFCB-B8C744E2DB00}"/>
+                <a16:creationId xmlns:a16="http://schemas.microsoft.com/office/drawing/2014/main" xmlns="" id="{560A813A-CCBE-4B3A-BFCB-B8C744E2DB00}"/>
               </a:ext>
             </a:extLst>
           </p:cNvPr>
@@ -8702,7 +8884,7 @@
     </p:spTree>
     <p:extLst>
       <p:ext uri="{BB962C8B-B14F-4D97-AF65-F5344CB8AC3E}">
-        <p14:creationId xmlns="" xmlns:p14="http://schemas.microsoft.com/office/powerpoint/2010/main" val="938092198"/>
+        <p14:creationId xmlns:p14="http://schemas.microsoft.com/office/powerpoint/2010/main" xmlns="" val="938092198"/>
       </p:ext>
     </p:extLst>
   </p:cSld>
@@ -8734,7 +8916,7 @@
           <p:cNvPr id="2" name="Vertical Title 1">
             <a:extLst>
               <a:ext uri="{FF2B5EF4-FFF2-40B4-BE49-F238E27FC236}">
-                <a16:creationId xmlns="" xmlns:a16="http://schemas.microsoft.com/office/drawing/2014/main" id="{341D79D4-66D7-468D-9E2A-7069EC2C84FC}"/>
+                <a16:creationId xmlns:a16="http://schemas.microsoft.com/office/drawing/2014/main" xmlns="" id="{341D79D4-66D7-468D-9E2A-7069EC2C84FC}"/>
               </a:ext>
             </a:extLst>
           </p:cNvPr>
@@ -8768,7 +8950,7 @@
           <p:cNvPr id="3" name="Vertical Text Placeholder 2">
             <a:extLst>
               <a:ext uri="{FF2B5EF4-FFF2-40B4-BE49-F238E27FC236}">
-                <a16:creationId xmlns="" xmlns:a16="http://schemas.microsoft.com/office/drawing/2014/main" id="{85300D69-8F78-481A-B4EE-9AD34F2DC1A7}"/>
+                <a16:creationId xmlns:a16="http://schemas.microsoft.com/office/drawing/2014/main" xmlns="" id="{85300D69-8F78-481A-B4EE-9AD34F2DC1A7}"/>
               </a:ext>
             </a:extLst>
           </p:cNvPr>
@@ -8831,7 +9013,7 @@
           <p:cNvPr id="4" name="Date Placeholder 3">
             <a:extLst>
               <a:ext uri="{FF2B5EF4-FFF2-40B4-BE49-F238E27FC236}">
-                <a16:creationId xmlns="" xmlns:a16="http://schemas.microsoft.com/office/drawing/2014/main" id="{AE742B29-A8F4-492E-97B0-1D556752C07D}"/>
+                <a16:creationId xmlns:a16="http://schemas.microsoft.com/office/drawing/2014/main" xmlns="" id="{AE742B29-A8F4-492E-97B0-1D556752C07D}"/>
               </a:ext>
             </a:extLst>
           </p:cNvPr>
@@ -8861,7 +9043,7 @@
           <p:cNvPr id="5" name="Footer Placeholder 4">
             <a:extLst>
               <a:ext uri="{FF2B5EF4-FFF2-40B4-BE49-F238E27FC236}">
-                <a16:creationId xmlns="" xmlns:a16="http://schemas.microsoft.com/office/drawing/2014/main" id="{FAC4F6D6-B736-406C-B58F-E422A13C25AD}"/>
+                <a16:creationId xmlns:a16="http://schemas.microsoft.com/office/drawing/2014/main" xmlns="" id="{FAC4F6D6-B736-406C-B58F-E422A13C25AD}"/>
               </a:ext>
             </a:extLst>
           </p:cNvPr>
@@ -8886,7 +9068,7 @@
           <p:cNvPr id="6" name="Slide Number Placeholder 5">
             <a:extLst>
               <a:ext uri="{FF2B5EF4-FFF2-40B4-BE49-F238E27FC236}">
-                <a16:creationId xmlns="" xmlns:a16="http://schemas.microsoft.com/office/drawing/2014/main" id="{93033BAC-8652-4093-853A-4D976AE9C607}"/>
+                <a16:creationId xmlns:a16="http://schemas.microsoft.com/office/drawing/2014/main" xmlns="" id="{93033BAC-8652-4093-853A-4D976AE9C607}"/>
               </a:ext>
             </a:extLst>
           </p:cNvPr>
@@ -8914,7 +9096,7 @@
     </p:spTree>
     <p:extLst>
       <p:ext uri="{BB962C8B-B14F-4D97-AF65-F5344CB8AC3E}">
-        <p14:creationId xmlns="" xmlns:p14="http://schemas.microsoft.com/office/powerpoint/2010/main" val="2299834497"/>
+        <p14:creationId xmlns:p14="http://schemas.microsoft.com/office/powerpoint/2010/main" xmlns="" val="2299834497"/>
       </p:ext>
     </p:extLst>
   </p:cSld>
@@ -9013,7 +9195,7 @@
     </p:spTree>
     <p:extLst>
       <p:ext uri="{BB962C8B-B14F-4D97-AF65-F5344CB8AC3E}">
-        <p14:creationId xmlns="" xmlns:p14="http://schemas.microsoft.com/office/powerpoint/2010/main" val="2455468915"/>
+        <p14:creationId xmlns:p14="http://schemas.microsoft.com/office/powerpoint/2010/main" xmlns="" val="2455468915"/>
       </p:ext>
     </p:extLst>
   </p:cSld>
@@ -9453,7 +9635,7 @@
     </p:spTree>
     <p:extLst>
       <p:ext uri="{BB962C8B-B14F-4D97-AF65-F5344CB8AC3E}">
-        <p14:creationId xmlns="" xmlns:p14="http://schemas.microsoft.com/office/powerpoint/2010/main" val="3507515198"/>
+        <p14:creationId xmlns:p14="http://schemas.microsoft.com/office/powerpoint/2010/main" xmlns="" val="3507515198"/>
       </p:ext>
     </p:extLst>
   </p:cSld>
@@ -9779,7 +9961,7 @@
     </p:spTree>
     <p:extLst>
       <p:ext uri="{BB962C8B-B14F-4D97-AF65-F5344CB8AC3E}">
-        <p14:creationId xmlns="" xmlns:p14="http://schemas.microsoft.com/office/powerpoint/2010/main" val="1150365713"/>
+        <p14:creationId xmlns:p14="http://schemas.microsoft.com/office/powerpoint/2010/main" xmlns="" val="1150365713"/>
       </p:ext>
     </p:extLst>
   </p:cSld>
@@ -9811,7 +9993,7 @@
           <p:cNvPr id="2" name="Title 1">
             <a:extLst>
               <a:ext uri="{FF2B5EF4-FFF2-40B4-BE49-F238E27FC236}">
-                <a16:creationId xmlns="" xmlns:a16="http://schemas.microsoft.com/office/drawing/2014/main" id="{68FF492B-5C21-421A-A4FF-E11C2D5D8375}"/>
+                <a16:creationId xmlns:a16="http://schemas.microsoft.com/office/drawing/2014/main" xmlns="" id="{68FF492B-5C21-421A-A4FF-E11C2D5D8375}"/>
               </a:ext>
             </a:extLst>
           </p:cNvPr>
@@ -9840,7 +10022,7 @@
           <p:cNvPr id="3" name="Content Placeholder 2">
             <a:extLst>
               <a:ext uri="{FF2B5EF4-FFF2-40B4-BE49-F238E27FC236}">
-                <a16:creationId xmlns="" xmlns:a16="http://schemas.microsoft.com/office/drawing/2014/main" id="{A8C3E072-A241-4CF5-B552-A4F50578DB82}"/>
+                <a16:creationId xmlns:a16="http://schemas.microsoft.com/office/drawing/2014/main" xmlns="" id="{A8C3E072-A241-4CF5-B552-A4F50578DB82}"/>
               </a:ext>
             </a:extLst>
           </p:cNvPr>
@@ -9898,7 +10080,7 @@
           <p:cNvPr id="4" name="Date Placeholder 3">
             <a:extLst>
               <a:ext uri="{FF2B5EF4-FFF2-40B4-BE49-F238E27FC236}">
-                <a16:creationId xmlns="" xmlns:a16="http://schemas.microsoft.com/office/drawing/2014/main" id="{F618429B-5989-46E2-845C-BA5F45A2680B}"/>
+                <a16:creationId xmlns:a16="http://schemas.microsoft.com/office/drawing/2014/main" xmlns="" id="{F618429B-5989-46E2-845C-BA5F45A2680B}"/>
               </a:ext>
             </a:extLst>
           </p:cNvPr>
@@ -9928,7 +10110,7 @@
           <p:cNvPr id="5" name="Footer Placeholder 4">
             <a:extLst>
               <a:ext uri="{FF2B5EF4-FFF2-40B4-BE49-F238E27FC236}">
-                <a16:creationId xmlns="" xmlns:a16="http://schemas.microsoft.com/office/drawing/2014/main" id="{F08EC445-DB41-4438-A982-8933B92F1B59}"/>
+                <a16:creationId xmlns:a16="http://schemas.microsoft.com/office/drawing/2014/main" xmlns="" id="{F08EC445-DB41-4438-A982-8933B92F1B59}"/>
               </a:ext>
             </a:extLst>
           </p:cNvPr>
@@ -9953,7 +10135,7 @@
           <p:cNvPr id="6" name="Slide Number Placeholder 5">
             <a:extLst>
               <a:ext uri="{FF2B5EF4-FFF2-40B4-BE49-F238E27FC236}">
-                <a16:creationId xmlns="" xmlns:a16="http://schemas.microsoft.com/office/drawing/2014/main" id="{3A0C9CF6-F6D9-4E98-855D-327212CCE32C}"/>
+                <a16:creationId xmlns:a16="http://schemas.microsoft.com/office/drawing/2014/main" xmlns="" id="{3A0C9CF6-F6D9-4E98-855D-327212CCE32C}"/>
               </a:ext>
             </a:extLst>
           </p:cNvPr>
@@ -9981,7 +10163,7 @@
     </p:spTree>
     <p:extLst>
       <p:ext uri="{BB962C8B-B14F-4D97-AF65-F5344CB8AC3E}">
-        <p14:creationId xmlns="" xmlns:p14="http://schemas.microsoft.com/office/powerpoint/2010/main" val="829059411"/>
+        <p14:creationId xmlns:p14="http://schemas.microsoft.com/office/powerpoint/2010/main" xmlns="" val="829059411"/>
       </p:ext>
     </p:extLst>
   </p:cSld>
@@ -10013,7 +10195,7 @@
           <p:cNvPr id="2" name="Title 1">
             <a:extLst>
               <a:ext uri="{FF2B5EF4-FFF2-40B4-BE49-F238E27FC236}">
-                <a16:creationId xmlns="" xmlns:a16="http://schemas.microsoft.com/office/drawing/2014/main" id="{CBBC05BB-01C8-49BD-8B74-616B69DE1A78}"/>
+                <a16:creationId xmlns:a16="http://schemas.microsoft.com/office/drawing/2014/main" xmlns="" id="{CBBC05BB-01C8-49BD-8B74-616B69DE1A78}"/>
               </a:ext>
             </a:extLst>
           </p:cNvPr>
@@ -10051,7 +10233,7 @@
           <p:cNvPr id="3" name="Text Placeholder 2">
             <a:extLst>
               <a:ext uri="{FF2B5EF4-FFF2-40B4-BE49-F238E27FC236}">
-                <a16:creationId xmlns="" xmlns:a16="http://schemas.microsoft.com/office/drawing/2014/main" id="{94454D3C-1694-4C15-A057-4B36E45FB539}"/>
+                <a16:creationId xmlns:a16="http://schemas.microsoft.com/office/drawing/2014/main" xmlns="" id="{94454D3C-1694-4C15-A057-4B36E45FB539}"/>
               </a:ext>
             </a:extLst>
           </p:cNvPr>
@@ -10176,7 +10358,7 @@
           <p:cNvPr id="4" name="Date Placeholder 3">
             <a:extLst>
               <a:ext uri="{FF2B5EF4-FFF2-40B4-BE49-F238E27FC236}">
-                <a16:creationId xmlns="" xmlns:a16="http://schemas.microsoft.com/office/drawing/2014/main" id="{3F2EB091-FDA6-4305-896D-933D448B2C29}"/>
+                <a16:creationId xmlns:a16="http://schemas.microsoft.com/office/drawing/2014/main" xmlns="" id="{3F2EB091-FDA6-4305-896D-933D448B2C29}"/>
               </a:ext>
             </a:extLst>
           </p:cNvPr>
@@ -10206,7 +10388,7 @@
           <p:cNvPr id="5" name="Footer Placeholder 4">
             <a:extLst>
               <a:ext uri="{FF2B5EF4-FFF2-40B4-BE49-F238E27FC236}">
-                <a16:creationId xmlns="" xmlns:a16="http://schemas.microsoft.com/office/drawing/2014/main" id="{B2DBCB72-0FB8-4BD5-BE3B-CCD0E1B27768}"/>
+                <a16:creationId xmlns:a16="http://schemas.microsoft.com/office/drawing/2014/main" xmlns="" id="{B2DBCB72-0FB8-4BD5-BE3B-CCD0E1B27768}"/>
               </a:ext>
             </a:extLst>
           </p:cNvPr>
@@ -10231,7 +10413,7 @@
           <p:cNvPr id="6" name="Slide Number Placeholder 5">
             <a:extLst>
               <a:ext uri="{FF2B5EF4-FFF2-40B4-BE49-F238E27FC236}">
-                <a16:creationId xmlns="" xmlns:a16="http://schemas.microsoft.com/office/drawing/2014/main" id="{68B88D1F-F6AE-4549-9DF7-3EB71E352B03}"/>
+                <a16:creationId xmlns:a16="http://schemas.microsoft.com/office/drawing/2014/main" xmlns="" id="{68B88D1F-F6AE-4549-9DF7-3EB71E352B03}"/>
               </a:ext>
             </a:extLst>
           </p:cNvPr>
@@ -10259,7 +10441,7 @@
     </p:spTree>
     <p:extLst>
       <p:ext uri="{BB962C8B-B14F-4D97-AF65-F5344CB8AC3E}">
-        <p14:creationId xmlns="" xmlns:p14="http://schemas.microsoft.com/office/powerpoint/2010/main" val="152555605"/>
+        <p14:creationId xmlns:p14="http://schemas.microsoft.com/office/powerpoint/2010/main" xmlns="" val="152555605"/>
       </p:ext>
     </p:extLst>
   </p:cSld>
@@ -10291,7 +10473,7 @@
           <p:cNvPr id="2" name="Title 1">
             <a:extLst>
               <a:ext uri="{FF2B5EF4-FFF2-40B4-BE49-F238E27FC236}">
-                <a16:creationId xmlns="" xmlns:a16="http://schemas.microsoft.com/office/drawing/2014/main" id="{94F084E6-2F58-4A3A-9858-837A5A66B264}"/>
+                <a16:creationId xmlns:a16="http://schemas.microsoft.com/office/drawing/2014/main" xmlns="" id="{94F084E6-2F58-4A3A-9858-837A5A66B264}"/>
               </a:ext>
             </a:extLst>
           </p:cNvPr>
@@ -10320,7 +10502,7 @@
           <p:cNvPr id="3" name="Content Placeholder 2">
             <a:extLst>
               <a:ext uri="{FF2B5EF4-FFF2-40B4-BE49-F238E27FC236}">
-                <a16:creationId xmlns="" xmlns:a16="http://schemas.microsoft.com/office/drawing/2014/main" id="{7E4A793E-9E75-4F4E-9BF2-2569A6133E89}"/>
+                <a16:creationId xmlns:a16="http://schemas.microsoft.com/office/drawing/2014/main" xmlns="" id="{7E4A793E-9E75-4F4E-9BF2-2569A6133E89}"/>
               </a:ext>
             </a:extLst>
           </p:cNvPr>
@@ -10383,7 +10565,7 @@
           <p:cNvPr id="4" name="Content Placeholder 3">
             <a:extLst>
               <a:ext uri="{FF2B5EF4-FFF2-40B4-BE49-F238E27FC236}">
-                <a16:creationId xmlns="" xmlns:a16="http://schemas.microsoft.com/office/drawing/2014/main" id="{5E2B719C-6019-4312-8FE8-6E362F42FF34}"/>
+                <a16:creationId xmlns:a16="http://schemas.microsoft.com/office/drawing/2014/main" xmlns="" id="{5E2B719C-6019-4312-8FE8-6E362F42FF34}"/>
               </a:ext>
             </a:extLst>
           </p:cNvPr>
@@ -10446,7 +10628,7 @@
           <p:cNvPr id="5" name="Date Placeholder 4">
             <a:extLst>
               <a:ext uri="{FF2B5EF4-FFF2-40B4-BE49-F238E27FC236}">
-                <a16:creationId xmlns="" xmlns:a16="http://schemas.microsoft.com/office/drawing/2014/main" id="{5635427B-6313-4FE3-96B4-9F81740B56BA}"/>
+                <a16:creationId xmlns:a16="http://schemas.microsoft.com/office/drawing/2014/main" xmlns="" id="{5635427B-6313-4FE3-96B4-9F81740B56BA}"/>
               </a:ext>
             </a:extLst>
           </p:cNvPr>
@@ -10476,7 +10658,7 @@
           <p:cNvPr id="6" name="Footer Placeholder 5">
             <a:extLst>
               <a:ext uri="{FF2B5EF4-FFF2-40B4-BE49-F238E27FC236}">
-                <a16:creationId xmlns="" xmlns:a16="http://schemas.microsoft.com/office/drawing/2014/main" id="{845D6C46-CF4E-4A65-ACA8-0A65CB79A4B8}"/>
+                <a16:creationId xmlns:a16="http://schemas.microsoft.com/office/drawing/2014/main" xmlns="" id="{845D6C46-CF4E-4A65-ACA8-0A65CB79A4B8}"/>
               </a:ext>
             </a:extLst>
           </p:cNvPr>
@@ -10501,7 +10683,7 @@
           <p:cNvPr id="7" name="Slide Number Placeholder 6">
             <a:extLst>
               <a:ext uri="{FF2B5EF4-FFF2-40B4-BE49-F238E27FC236}">
-                <a16:creationId xmlns="" xmlns:a16="http://schemas.microsoft.com/office/drawing/2014/main" id="{CBFBBAF7-3BB6-4948-86A5-8CB5B0354330}"/>
+                <a16:creationId xmlns:a16="http://schemas.microsoft.com/office/drawing/2014/main" xmlns="" id="{CBFBBAF7-3BB6-4948-86A5-8CB5B0354330}"/>
               </a:ext>
             </a:extLst>
           </p:cNvPr>
@@ -10529,7 +10711,7 @@
     </p:spTree>
     <p:extLst>
       <p:ext uri="{BB962C8B-B14F-4D97-AF65-F5344CB8AC3E}">
-        <p14:creationId xmlns="" xmlns:p14="http://schemas.microsoft.com/office/powerpoint/2010/main" val="2168007169"/>
+        <p14:creationId xmlns:p14="http://schemas.microsoft.com/office/powerpoint/2010/main" xmlns="" val="2168007169"/>
       </p:ext>
     </p:extLst>
   </p:cSld>
@@ -10561,7 +10743,7 @@
           <p:cNvPr id="2" name="Title 1">
             <a:extLst>
               <a:ext uri="{FF2B5EF4-FFF2-40B4-BE49-F238E27FC236}">
-                <a16:creationId xmlns="" xmlns:a16="http://schemas.microsoft.com/office/drawing/2014/main" id="{F2547E85-A4AF-4444-8667-8D4A0AFF4793}"/>
+                <a16:creationId xmlns:a16="http://schemas.microsoft.com/office/drawing/2014/main" xmlns="" id="{F2547E85-A4AF-4444-8667-8D4A0AFF4793}"/>
               </a:ext>
             </a:extLst>
           </p:cNvPr>
@@ -10595,7 +10777,7 @@
           <p:cNvPr id="3" name="Text Placeholder 2">
             <a:extLst>
               <a:ext uri="{FF2B5EF4-FFF2-40B4-BE49-F238E27FC236}">
-                <a16:creationId xmlns="" xmlns:a16="http://schemas.microsoft.com/office/drawing/2014/main" id="{EF9B927C-BCAF-47E7-986A-143F6AC4F537}"/>
+                <a16:creationId xmlns:a16="http://schemas.microsoft.com/office/drawing/2014/main" xmlns="" id="{EF9B927C-BCAF-47E7-986A-143F6AC4F537}"/>
               </a:ext>
             </a:extLst>
           </p:cNvPr>
@@ -10666,7 +10848,7 @@
           <p:cNvPr id="4" name="Content Placeholder 3">
             <a:extLst>
               <a:ext uri="{FF2B5EF4-FFF2-40B4-BE49-F238E27FC236}">
-                <a16:creationId xmlns="" xmlns:a16="http://schemas.microsoft.com/office/drawing/2014/main" id="{69EAEA82-5F87-47B2-B09F-F4FD8FC704BC}"/>
+                <a16:creationId xmlns:a16="http://schemas.microsoft.com/office/drawing/2014/main" xmlns="" id="{69EAEA82-5F87-47B2-B09F-F4FD8FC704BC}"/>
               </a:ext>
             </a:extLst>
           </p:cNvPr>
@@ -10729,7 +10911,7 @@
           <p:cNvPr id="5" name="Text Placeholder 4">
             <a:extLst>
               <a:ext uri="{FF2B5EF4-FFF2-40B4-BE49-F238E27FC236}">
-                <a16:creationId xmlns="" xmlns:a16="http://schemas.microsoft.com/office/drawing/2014/main" id="{B7835062-C06F-4A23-A1BB-47FC4CBDB56D}"/>
+                <a16:creationId xmlns:a16="http://schemas.microsoft.com/office/drawing/2014/main" xmlns="" id="{B7835062-C06F-4A23-A1BB-47FC4CBDB56D}"/>
               </a:ext>
             </a:extLst>
           </p:cNvPr>
@@ -10800,7 +10982,7 @@
           <p:cNvPr id="6" name="Content Placeholder 5">
             <a:extLst>
               <a:ext uri="{FF2B5EF4-FFF2-40B4-BE49-F238E27FC236}">
-                <a16:creationId xmlns="" xmlns:a16="http://schemas.microsoft.com/office/drawing/2014/main" id="{3C213DA1-52D2-4BC1-BF94-02511D59B3BE}"/>
+                <a16:creationId xmlns:a16="http://schemas.microsoft.com/office/drawing/2014/main" xmlns="" id="{3C213DA1-52D2-4BC1-BF94-02511D59B3BE}"/>
               </a:ext>
             </a:extLst>
           </p:cNvPr>
@@ -10863,7 +11045,7 @@
           <p:cNvPr id="7" name="Date Placeholder 6">
             <a:extLst>
               <a:ext uri="{FF2B5EF4-FFF2-40B4-BE49-F238E27FC236}">
-                <a16:creationId xmlns="" xmlns:a16="http://schemas.microsoft.com/office/drawing/2014/main" id="{922E5C67-398E-4024-939F-39B502B58619}"/>
+                <a16:creationId xmlns:a16="http://schemas.microsoft.com/office/drawing/2014/main" xmlns="" id="{922E5C67-398E-4024-939F-39B502B58619}"/>
               </a:ext>
             </a:extLst>
           </p:cNvPr>
@@ -10893,7 +11075,7 @@
           <p:cNvPr id="8" name="Footer Placeholder 7">
             <a:extLst>
               <a:ext uri="{FF2B5EF4-FFF2-40B4-BE49-F238E27FC236}">
-                <a16:creationId xmlns="" xmlns:a16="http://schemas.microsoft.com/office/drawing/2014/main" id="{C9E6EEFB-99A4-484E-AE3D-E4C4E4553C84}"/>
+                <a16:creationId xmlns:a16="http://schemas.microsoft.com/office/drawing/2014/main" xmlns="" id="{C9E6EEFB-99A4-484E-AE3D-E4C4E4553C84}"/>
               </a:ext>
             </a:extLst>
           </p:cNvPr>
@@ -10918,7 +11100,7 @@
           <p:cNvPr id="9" name="Slide Number Placeholder 8">
             <a:extLst>
               <a:ext uri="{FF2B5EF4-FFF2-40B4-BE49-F238E27FC236}">
-                <a16:creationId xmlns="" xmlns:a16="http://schemas.microsoft.com/office/drawing/2014/main" id="{BB7666CA-8CF1-4577-AB73-AD6A93B21FE4}"/>
+                <a16:creationId xmlns:a16="http://schemas.microsoft.com/office/drawing/2014/main" xmlns="" id="{BB7666CA-8CF1-4577-AB73-AD6A93B21FE4}"/>
               </a:ext>
             </a:extLst>
           </p:cNvPr>
@@ -10946,7 +11128,7 @@
     </p:spTree>
     <p:extLst>
       <p:ext uri="{BB962C8B-B14F-4D97-AF65-F5344CB8AC3E}">
-        <p14:creationId xmlns="" xmlns:p14="http://schemas.microsoft.com/office/powerpoint/2010/main" val="4118492272"/>
+        <p14:creationId xmlns:p14="http://schemas.microsoft.com/office/powerpoint/2010/main" xmlns="" val="4118492272"/>
       </p:ext>
     </p:extLst>
   </p:cSld>
@@ -10978,7 +11160,7 @@
           <p:cNvPr id="2" name="Title 1">
             <a:extLst>
               <a:ext uri="{FF2B5EF4-FFF2-40B4-BE49-F238E27FC236}">
-                <a16:creationId xmlns="" xmlns:a16="http://schemas.microsoft.com/office/drawing/2014/main" id="{BBC4291C-F7BC-4EF2-8B49-1441F3EA64EF}"/>
+                <a16:creationId xmlns:a16="http://schemas.microsoft.com/office/drawing/2014/main" xmlns="" id="{BBC4291C-F7BC-4EF2-8B49-1441F3EA64EF}"/>
               </a:ext>
             </a:extLst>
           </p:cNvPr>
@@ -11007,7 +11189,7 @@
           <p:cNvPr id="3" name="Date Placeholder 2">
             <a:extLst>
               <a:ext uri="{FF2B5EF4-FFF2-40B4-BE49-F238E27FC236}">
-                <a16:creationId xmlns="" xmlns:a16="http://schemas.microsoft.com/office/drawing/2014/main" id="{F229FB28-4A64-44FE-B797-27267184AEB8}"/>
+                <a16:creationId xmlns:a16="http://schemas.microsoft.com/office/drawing/2014/main" xmlns="" id="{F229FB28-4A64-44FE-B797-27267184AEB8}"/>
               </a:ext>
             </a:extLst>
           </p:cNvPr>
@@ -11037,7 +11219,7 @@
           <p:cNvPr id="4" name="Footer Placeholder 3">
             <a:extLst>
               <a:ext uri="{FF2B5EF4-FFF2-40B4-BE49-F238E27FC236}">
-                <a16:creationId xmlns="" xmlns:a16="http://schemas.microsoft.com/office/drawing/2014/main" id="{83D8E422-AC7B-414E-99DF-5AEC0169EAFB}"/>
+                <a16:creationId xmlns:a16="http://schemas.microsoft.com/office/drawing/2014/main" xmlns="" id="{83D8E422-AC7B-414E-99DF-5AEC0169EAFB}"/>
               </a:ext>
             </a:extLst>
           </p:cNvPr>
@@ -11062,7 +11244,7 @@
           <p:cNvPr id="5" name="Slide Number Placeholder 4">
             <a:extLst>
               <a:ext uri="{FF2B5EF4-FFF2-40B4-BE49-F238E27FC236}">
-                <a16:creationId xmlns="" xmlns:a16="http://schemas.microsoft.com/office/drawing/2014/main" id="{7E6B7663-0796-4587-8875-EA886C1358BF}"/>
+                <a16:creationId xmlns:a16="http://schemas.microsoft.com/office/drawing/2014/main" xmlns="" id="{7E6B7663-0796-4587-8875-EA886C1358BF}"/>
               </a:ext>
             </a:extLst>
           </p:cNvPr>
@@ -11090,7 +11272,7 @@
     </p:spTree>
     <p:extLst>
       <p:ext uri="{BB962C8B-B14F-4D97-AF65-F5344CB8AC3E}">
-        <p14:creationId xmlns="" xmlns:p14="http://schemas.microsoft.com/office/powerpoint/2010/main" val="3095291446"/>
+        <p14:creationId xmlns:p14="http://schemas.microsoft.com/office/powerpoint/2010/main" xmlns="" val="3095291446"/>
       </p:ext>
     </p:extLst>
   </p:cSld>
@@ -11122,7 +11304,7 @@
           <p:cNvPr id="2" name="Date Placeholder 1">
             <a:extLst>
               <a:ext uri="{FF2B5EF4-FFF2-40B4-BE49-F238E27FC236}">
-                <a16:creationId xmlns="" xmlns:a16="http://schemas.microsoft.com/office/drawing/2014/main" id="{E68AD952-988A-44BE-800A-AEED97E130B3}"/>
+                <a16:creationId xmlns:a16="http://schemas.microsoft.com/office/drawing/2014/main" xmlns="" id="{E68AD952-988A-44BE-800A-AEED97E130B3}"/>
               </a:ext>
             </a:extLst>
           </p:cNvPr>
@@ -11152,7 +11334,7 @@
           <p:cNvPr id="3" name="Footer Placeholder 2">
             <a:extLst>
               <a:ext uri="{FF2B5EF4-FFF2-40B4-BE49-F238E27FC236}">
-                <a16:creationId xmlns="" xmlns:a16="http://schemas.microsoft.com/office/drawing/2014/main" id="{94D7DF4A-30AB-4484-B800-E697AD9D50DA}"/>
+                <a16:creationId xmlns:a16="http://schemas.microsoft.com/office/drawing/2014/main" xmlns="" id="{94D7DF4A-30AB-4484-B800-E697AD9D50DA}"/>
               </a:ext>
             </a:extLst>
           </p:cNvPr>
@@ -11177,7 +11359,7 @@
           <p:cNvPr id="4" name="Slide Number Placeholder 3">
             <a:extLst>
               <a:ext uri="{FF2B5EF4-FFF2-40B4-BE49-F238E27FC236}">
-                <a16:creationId xmlns="" xmlns:a16="http://schemas.microsoft.com/office/drawing/2014/main" id="{855CFEB7-3CB7-4BE7-87A9-6D1F68C60ABA}"/>
+                <a16:creationId xmlns:a16="http://schemas.microsoft.com/office/drawing/2014/main" xmlns="" id="{855CFEB7-3CB7-4BE7-87A9-6D1F68C60ABA}"/>
               </a:ext>
             </a:extLst>
           </p:cNvPr>
@@ -11205,7 +11387,7 @@
     </p:spTree>
     <p:extLst>
       <p:ext uri="{BB962C8B-B14F-4D97-AF65-F5344CB8AC3E}">
-        <p14:creationId xmlns="" xmlns:p14="http://schemas.microsoft.com/office/powerpoint/2010/main" val="1281884266"/>
+        <p14:creationId xmlns:p14="http://schemas.microsoft.com/office/powerpoint/2010/main" xmlns="" val="1281884266"/>
       </p:ext>
     </p:extLst>
   </p:cSld>
@@ -11237,7 +11419,7 @@
           <p:cNvPr id="2" name="Title 1">
             <a:extLst>
               <a:ext uri="{FF2B5EF4-FFF2-40B4-BE49-F238E27FC236}">
-                <a16:creationId xmlns="" xmlns:a16="http://schemas.microsoft.com/office/drawing/2014/main" id="{EE53AD0B-9EC2-4FC9-A0D3-C3CF335830FC}"/>
+                <a16:creationId xmlns:a16="http://schemas.microsoft.com/office/drawing/2014/main" xmlns="" id="{EE53AD0B-9EC2-4FC9-A0D3-C3CF335830FC}"/>
               </a:ext>
             </a:extLst>
           </p:cNvPr>
@@ -11275,7 +11457,7 @@
           <p:cNvPr id="3" name="Content Placeholder 2">
             <a:extLst>
               <a:ext uri="{FF2B5EF4-FFF2-40B4-BE49-F238E27FC236}">
-                <a16:creationId xmlns="" xmlns:a16="http://schemas.microsoft.com/office/drawing/2014/main" id="{187B30A0-D905-4224-B212-7023E9DB9EE2}"/>
+                <a16:creationId xmlns:a16="http://schemas.microsoft.com/office/drawing/2014/main" xmlns="" id="{187B30A0-D905-4224-B212-7023E9DB9EE2}"/>
               </a:ext>
             </a:extLst>
           </p:cNvPr>
@@ -11366,7 +11548,7 @@
           <p:cNvPr id="4" name="Text Placeholder 3">
             <a:extLst>
               <a:ext uri="{FF2B5EF4-FFF2-40B4-BE49-F238E27FC236}">
-                <a16:creationId xmlns="" xmlns:a16="http://schemas.microsoft.com/office/drawing/2014/main" id="{687737D5-18C6-4CFB-8E7C-3B10FAAB9DDA}"/>
+                <a16:creationId xmlns:a16="http://schemas.microsoft.com/office/drawing/2014/main" xmlns="" id="{687737D5-18C6-4CFB-8E7C-3B10FAAB9DDA}"/>
               </a:ext>
             </a:extLst>
           </p:cNvPr>
@@ -11437,7 +11619,7 @@
           <p:cNvPr id="5" name="Date Placeholder 4">
             <a:extLst>
               <a:ext uri="{FF2B5EF4-FFF2-40B4-BE49-F238E27FC236}">
-                <a16:creationId xmlns="" xmlns:a16="http://schemas.microsoft.com/office/drawing/2014/main" id="{A713BDE2-50B8-4C60-8A7D-4E3BF3BAAE18}"/>
+                <a16:creationId xmlns:a16="http://schemas.microsoft.com/office/drawing/2014/main" xmlns="" id="{A713BDE2-50B8-4C60-8A7D-4E3BF3BAAE18}"/>
               </a:ext>
             </a:extLst>
           </p:cNvPr>
@@ -11467,7 +11649,7 @@
           <p:cNvPr id="6" name="Footer Placeholder 5">
             <a:extLst>
               <a:ext uri="{FF2B5EF4-FFF2-40B4-BE49-F238E27FC236}">
-                <a16:creationId xmlns="" xmlns:a16="http://schemas.microsoft.com/office/drawing/2014/main" id="{BE9A5856-A559-4D84-8318-DD3B9AAF5467}"/>
+                <a16:creationId xmlns:a16="http://schemas.microsoft.com/office/drawing/2014/main" xmlns="" id="{BE9A5856-A559-4D84-8318-DD3B9AAF5467}"/>
               </a:ext>
             </a:extLst>
           </p:cNvPr>
@@ -11492,7 +11674,7 @@
           <p:cNvPr id="7" name="Slide Number Placeholder 6">
             <a:extLst>
               <a:ext uri="{FF2B5EF4-FFF2-40B4-BE49-F238E27FC236}">
-                <a16:creationId xmlns="" xmlns:a16="http://schemas.microsoft.com/office/drawing/2014/main" id="{01D28AD8-5890-4C87-B821-C46D6FAC0D4C}"/>
+                <a16:creationId xmlns:a16="http://schemas.microsoft.com/office/drawing/2014/main" xmlns="" id="{01D28AD8-5890-4C87-B821-C46D6FAC0D4C}"/>
               </a:ext>
             </a:extLst>
           </p:cNvPr>
@@ -11520,7 +11702,7 @@
     </p:spTree>
     <p:extLst>
       <p:ext uri="{BB962C8B-B14F-4D97-AF65-F5344CB8AC3E}">
-        <p14:creationId xmlns="" xmlns:p14="http://schemas.microsoft.com/office/powerpoint/2010/main" val="3872718513"/>
+        <p14:creationId xmlns:p14="http://schemas.microsoft.com/office/powerpoint/2010/main" xmlns="" val="3872718513"/>
       </p:ext>
     </p:extLst>
   </p:cSld>
@@ -11552,7 +11734,7 @@
           <p:cNvPr id="2" name="Title 1">
             <a:extLst>
               <a:ext uri="{FF2B5EF4-FFF2-40B4-BE49-F238E27FC236}">
-                <a16:creationId xmlns="" xmlns:a16="http://schemas.microsoft.com/office/drawing/2014/main" id="{970CED16-5FB3-4908-940F-E8808C896C19}"/>
+                <a16:creationId xmlns:a16="http://schemas.microsoft.com/office/drawing/2014/main" xmlns="" id="{970CED16-5FB3-4908-940F-E8808C896C19}"/>
               </a:ext>
             </a:extLst>
           </p:cNvPr>
@@ -11590,7 +11772,7 @@
           <p:cNvPr id="3" name="Picture Placeholder 2">
             <a:extLst>
               <a:ext uri="{FF2B5EF4-FFF2-40B4-BE49-F238E27FC236}">
-                <a16:creationId xmlns="" xmlns:a16="http://schemas.microsoft.com/office/drawing/2014/main" id="{BECD6D43-1380-411A-A347-180BB8053A16}"/>
+                <a16:creationId xmlns:a16="http://schemas.microsoft.com/office/drawing/2014/main" xmlns="" id="{BECD6D43-1380-411A-A347-180BB8053A16}"/>
               </a:ext>
             </a:extLst>
           </p:cNvPr>
@@ -11657,7 +11839,7 @@
           <p:cNvPr id="4" name="Text Placeholder 3">
             <a:extLst>
               <a:ext uri="{FF2B5EF4-FFF2-40B4-BE49-F238E27FC236}">
-                <a16:creationId xmlns="" xmlns:a16="http://schemas.microsoft.com/office/drawing/2014/main" id="{95317566-4EA7-4E57-BC34-E7909907C36A}"/>
+                <a16:creationId xmlns:a16="http://schemas.microsoft.com/office/drawing/2014/main" xmlns="" id="{95317566-4EA7-4E57-BC34-E7909907C36A}"/>
               </a:ext>
             </a:extLst>
           </p:cNvPr>
@@ -11728,7 +11910,7 @@
           <p:cNvPr id="5" name="Date Placeholder 4">
             <a:extLst>
               <a:ext uri="{FF2B5EF4-FFF2-40B4-BE49-F238E27FC236}">
-                <a16:creationId xmlns="" xmlns:a16="http://schemas.microsoft.com/office/drawing/2014/main" id="{BF635BC4-0516-40FA-A17E-FA7F76B1B8E1}"/>
+                <a16:creationId xmlns:a16="http://schemas.microsoft.com/office/drawing/2014/main" xmlns="" id="{BF635BC4-0516-40FA-A17E-FA7F76B1B8E1}"/>
               </a:ext>
             </a:extLst>
           </p:cNvPr>
@@ -11758,7 +11940,7 @@
           <p:cNvPr id="6" name="Footer Placeholder 5">
             <a:extLst>
               <a:ext uri="{FF2B5EF4-FFF2-40B4-BE49-F238E27FC236}">
-                <a16:creationId xmlns="" xmlns:a16="http://schemas.microsoft.com/office/drawing/2014/main" id="{F21E64F8-B2CC-4FB4-89A6-5447875089D2}"/>
+                <a16:creationId xmlns:a16="http://schemas.microsoft.com/office/drawing/2014/main" xmlns="" id="{F21E64F8-B2CC-4FB4-89A6-5447875089D2}"/>
               </a:ext>
             </a:extLst>
           </p:cNvPr>
@@ -11783,7 +11965,7 @@
           <p:cNvPr id="7" name="Slide Number Placeholder 6">
             <a:extLst>
               <a:ext uri="{FF2B5EF4-FFF2-40B4-BE49-F238E27FC236}">
-                <a16:creationId xmlns="" xmlns:a16="http://schemas.microsoft.com/office/drawing/2014/main" id="{A7BF1AA2-F655-4673-9214-EB86140952FE}"/>
+                <a16:creationId xmlns:a16="http://schemas.microsoft.com/office/drawing/2014/main" xmlns="" id="{A7BF1AA2-F655-4673-9214-EB86140952FE}"/>
               </a:ext>
             </a:extLst>
           </p:cNvPr>
@@ -11811,7 +11993,7 @@
     </p:spTree>
     <p:extLst>
       <p:ext uri="{BB962C8B-B14F-4D97-AF65-F5344CB8AC3E}">
-        <p14:creationId xmlns="" xmlns:p14="http://schemas.microsoft.com/office/powerpoint/2010/main" val="3309267910"/>
+        <p14:creationId xmlns:p14="http://schemas.microsoft.com/office/powerpoint/2010/main" xmlns="" val="3309267910"/>
       </p:ext>
     </p:extLst>
   </p:cSld>
@@ -11848,7 +12030,7 @@
           <p:cNvPr id="2" name="Title Placeholder 1">
             <a:extLst>
               <a:ext uri="{FF2B5EF4-FFF2-40B4-BE49-F238E27FC236}">
-                <a16:creationId xmlns="" xmlns:a16="http://schemas.microsoft.com/office/drawing/2014/main" id="{E8A680C8-B19E-40B1-A390-E5C3D22C6D85}"/>
+                <a16:creationId xmlns:a16="http://schemas.microsoft.com/office/drawing/2014/main" xmlns="" id="{E8A680C8-B19E-40B1-A390-E5C3D22C6D85}"/>
               </a:ext>
             </a:extLst>
           </p:cNvPr>
@@ -11887,7 +12069,7 @@
           <p:cNvPr id="3" name="Text Placeholder 2">
             <a:extLst>
               <a:ext uri="{FF2B5EF4-FFF2-40B4-BE49-F238E27FC236}">
-                <a16:creationId xmlns="" xmlns:a16="http://schemas.microsoft.com/office/drawing/2014/main" id="{A7F2AFF6-7657-4CB0-9775-FFDD44169573}"/>
+                <a16:creationId xmlns:a16="http://schemas.microsoft.com/office/drawing/2014/main" xmlns="" id="{A7F2AFF6-7657-4CB0-9775-FFDD44169573}"/>
               </a:ext>
             </a:extLst>
           </p:cNvPr>
@@ -11955,7 +12137,7 @@
           <p:cNvPr id="4" name="Date Placeholder 3">
             <a:extLst>
               <a:ext uri="{FF2B5EF4-FFF2-40B4-BE49-F238E27FC236}">
-                <a16:creationId xmlns="" xmlns:a16="http://schemas.microsoft.com/office/drawing/2014/main" id="{F9BACC47-E134-4890-8B0D-1459CD0C90C6}"/>
+                <a16:creationId xmlns:a16="http://schemas.microsoft.com/office/drawing/2014/main" xmlns="" id="{F9BACC47-E134-4890-8B0D-1459CD0C90C6}"/>
               </a:ext>
             </a:extLst>
           </p:cNvPr>
@@ -12003,7 +12185,7 @@
           <p:cNvPr id="5" name="Footer Placeholder 4">
             <a:extLst>
               <a:ext uri="{FF2B5EF4-FFF2-40B4-BE49-F238E27FC236}">
-                <a16:creationId xmlns="" xmlns:a16="http://schemas.microsoft.com/office/drawing/2014/main" id="{9CF626ED-3D17-4C6F-9599-F14FA75226D1}"/>
+                <a16:creationId xmlns:a16="http://schemas.microsoft.com/office/drawing/2014/main" xmlns="" id="{9CF626ED-3D17-4C6F-9599-F14FA75226D1}"/>
               </a:ext>
             </a:extLst>
           </p:cNvPr>
@@ -12046,7 +12228,7 @@
           <p:cNvPr id="6" name="Slide Number Placeholder 5">
             <a:extLst>
               <a:ext uri="{FF2B5EF4-FFF2-40B4-BE49-F238E27FC236}">
-                <a16:creationId xmlns="" xmlns:a16="http://schemas.microsoft.com/office/drawing/2014/main" id="{1904C589-1476-4A45-A34D-13857528834C}"/>
+                <a16:creationId xmlns:a16="http://schemas.microsoft.com/office/drawing/2014/main" xmlns="" id="{1904C589-1476-4A45-A34D-13857528834C}"/>
               </a:ext>
             </a:extLst>
           </p:cNvPr>
@@ -12094,7 +12276,7 @@
           <p:cNvPr id="7" name="Rectangle 6">
             <a:extLst>
               <a:ext uri="{FF2B5EF4-FFF2-40B4-BE49-F238E27FC236}">
-                <a16:creationId xmlns="" xmlns:a16="http://schemas.microsoft.com/office/drawing/2014/main" id="{D0D22CE4-59BB-43D4-B1AD-47741DC07B76}"/>
+                <a16:creationId xmlns:a16="http://schemas.microsoft.com/office/drawing/2014/main" xmlns="" id="{D0D22CE4-59BB-43D4-B1AD-47741DC07B76}"/>
               </a:ext>
             </a:extLst>
           </p:cNvPr>
@@ -12146,7 +12328,7 @@
           <p:cNvPr id="8" name="Straight Connector 7">
             <a:extLst>
               <a:ext uri="{FF2B5EF4-FFF2-40B4-BE49-F238E27FC236}">
-                <a16:creationId xmlns="" xmlns:a16="http://schemas.microsoft.com/office/drawing/2014/main" id="{D9A0E9AF-2DAA-4695-8641-C80E3049FEF1}"/>
+                <a16:creationId xmlns:a16="http://schemas.microsoft.com/office/drawing/2014/main" xmlns="" id="{D9A0E9AF-2DAA-4695-8641-C80E3049FEF1}"/>
               </a:ext>
             </a:extLst>
           </p:cNvPr>
@@ -12185,7 +12367,7 @@
     </p:spTree>
     <p:extLst>
       <p:ext uri="{BB962C8B-B14F-4D97-AF65-F5344CB8AC3E}">
-        <p14:creationId xmlns="" xmlns:p14="http://schemas.microsoft.com/office/powerpoint/2010/main" val="2192175118"/>
+        <p14:creationId xmlns:p14="http://schemas.microsoft.com/office/powerpoint/2010/main" xmlns="" val="2192175118"/>
       </p:ext>
     </p:extLst>
   </p:cSld>
@@ -12560,7 +12742,7 @@
           <p:cNvPr id="6" name="Picture 5">
             <a:extLst>
               <a:ext uri="{FF2B5EF4-FFF2-40B4-BE49-F238E27FC236}">
-                <a16:creationId xmlns="" xmlns:a16="http://schemas.microsoft.com/office/drawing/2014/main" id="{D83BBFC4-765D-416B-AA41-1588EE96A5A4}"/>
+                <a16:creationId xmlns:a16="http://schemas.microsoft.com/office/drawing/2014/main" xmlns="" id="{D83BBFC4-765D-416B-AA41-1588EE96A5A4}"/>
               </a:ext>
             </a:extLst>
           </p:cNvPr>
@@ -12590,7 +12772,7 @@
           <p:cNvPr id="7" name="Title 1">
             <a:extLst>
               <a:ext uri="{FF2B5EF4-FFF2-40B4-BE49-F238E27FC236}">
-                <a16:creationId xmlns="" xmlns:a16="http://schemas.microsoft.com/office/drawing/2014/main" id="{DE2643FF-3488-4DEE-ABCF-113C84406461}"/>
+                <a16:creationId xmlns:a16="http://schemas.microsoft.com/office/drawing/2014/main" xmlns="" id="{DE2643FF-3488-4DEE-ABCF-113C84406461}"/>
               </a:ext>
             </a:extLst>
           </p:cNvPr>
@@ -12716,7 +12898,7 @@
           <p:cNvPr id="5" name="Title 1">
             <a:extLst>
               <a:ext uri="{FF2B5EF4-FFF2-40B4-BE49-F238E27FC236}">
-                <a16:creationId xmlns="" xmlns:a16="http://schemas.microsoft.com/office/drawing/2014/main" id="{BA780A13-678C-4540-A88D-76854F919740}"/>
+                <a16:creationId xmlns:a16="http://schemas.microsoft.com/office/drawing/2014/main" xmlns="" id="{BA780A13-678C-4540-A88D-76854F919740}"/>
               </a:ext>
             </a:extLst>
           </p:cNvPr>
@@ -12768,7 +12950,7 @@
           <p:cNvPr id="3" name="TextBox 2">
             <a:extLst>
               <a:ext uri="{FF2B5EF4-FFF2-40B4-BE49-F238E27FC236}">
-                <a16:creationId xmlns="" xmlns:a16="http://schemas.microsoft.com/office/drawing/2014/main" id="{8AEF8F8C-78CF-0EF8-2129-61BC9A191773}"/>
+                <a16:creationId xmlns:a16="http://schemas.microsoft.com/office/drawing/2014/main" xmlns="" id="{8AEF8F8C-78CF-0EF8-2129-61BC9A191773}"/>
               </a:ext>
             </a:extLst>
           </p:cNvPr>
@@ -12849,7 +13031,7 @@
           <p:cNvPr id="4" name="TextBox 3">
             <a:extLst>
               <a:ext uri="{FF2B5EF4-FFF2-40B4-BE49-F238E27FC236}">
-                <a16:creationId xmlns="" xmlns:a16="http://schemas.microsoft.com/office/drawing/2014/main" id="{B76FEBE0-20C2-4A28-0AC6-3237A74C219E}"/>
+                <a16:creationId xmlns:a16="http://schemas.microsoft.com/office/drawing/2014/main" xmlns="" id="{B76FEBE0-20C2-4A28-0AC6-3237A74C219E}"/>
               </a:ext>
             </a:extLst>
           </p:cNvPr>
@@ -12908,7 +13090,7 @@
           <p:cNvPr id="8" name="TextBox 7">
             <a:extLst>
               <a:ext uri="{FF2B5EF4-FFF2-40B4-BE49-F238E27FC236}">
-                <a16:creationId xmlns="" xmlns:a16="http://schemas.microsoft.com/office/drawing/2014/main" id="{2A7D6973-1D07-79F2-417D-F3DF9B4CFAD8}"/>
+                <a16:creationId xmlns:a16="http://schemas.microsoft.com/office/drawing/2014/main" xmlns="" id="{2A7D6973-1D07-79F2-417D-F3DF9B4CFAD8}"/>
               </a:ext>
             </a:extLst>
           </p:cNvPr>
@@ -12975,7 +13157,7 @@
     </p:spTree>
     <p:extLst>
       <p:ext uri="{BB962C8B-B14F-4D97-AF65-F5344CB8AC3E}">
-        <p14:creationId xmlns="" xmlns:p14="http://schemas.microsoft.com/office/powerpoint/2010/main" val="2471807738"/>
+        <p14:creationId xmlns:p14="http://schemas.microsoft.com/office/powerpoint/2010/main" xmlns="" val="2471807738"/>
       </p:ext>
     </p:extLst>
   </p:cSld>
@@ -13047,7 +13229,7 @@
           <p:cNvPr id="24" name="Title 1">
             <a:extLst>
               <a:ext uri="{FF2B5EF4-FFF2-40B4-BE49-F238E27FC236}">
-                <a16:creationId xmlns="" xmlns:a16="http://schemas.microsoft.com/office/drawing/2014/main" id="{D0EEB7D9-347A-449E-98D8-2D25EE328AA4}"/>
+                <a16:creationId xmlns:a16="http://schemas.microsoft.com/office/drawing/2014/main" xmlns="" id="{D0EEB7D9-347A-449E-98D8-2D25EE328AA4}"/>
               </a:ext>
             </a:extLst>
           </p:cNvPr>
@@ -13105,7 +13287,7 @@
           <p:cNvPr id="68" name="TextBox 67">
             <a:extLst>
               <a:ext uri="{FF2B5EF4-FFF2-40B4-BE49-F238E27FC236}">
-                <a16:creationId xmlns="" xmlns:a16="http://schemas.microsoft.com/office/drawing/2014/main" id="{235E8D85-01A5-4229-BE39-57FC6AAA6D6E}"/>
+                <a16:creationId xmlns:a16="http://schemas.microsoft.com/office/drawing/2014/main" xmlns="" id="{235E8D85-01A5-4229-BE39-57FC6AAA6D6E}"/>
               </a:ext>
             </a:extLst>
           </p:cNvPr>
@@ -13272,7 +13454,7 @@
     </p:spTree>
     <p:extLst>
       <p:ext uri="{BB962C8B-B14F-4D97-AF65-F5344CB8AC3E}">
-        <p14:creationId xmlns="" xmlns:p14="http://schemas.microsoft.com/office/powerpoint/2010/main" val="954013293"/>
+        <p14:creationId xmlns:p14="http://schemas.microsoft.com/office/powerpoint/2010/main" xmlns="" val="954013293"/>
       </p:ext>
     </p:extLst>
   </p:cSld>
@@ -13347,7 +13529,7 @@
           <p:cNvPr id="24" name="Title 1">
             <a:extLst>
               <a:ext uri="{FF2B5EF4-FFF2-40B4-BE49-F238E27FC236}">
-                <a16:creationId xmlns="" xmlns:a16="http://schemas.microsoft.com/office/drawing/2014/main" id="{D0EEB7D9-347A-449E-98D8-2D25EE328AA4}"/>
+                <a16:creationId xmlns:a16="http://schemas.microsoft.com/office/drawing/2014/main" xmlns="" id="{D0EEB7D9-347A-449E-98D8-2D25EE328AA4}"/>
               </a:ext>
             </a:extLst>
           </p:cNvPr>
@@ -13405,7 +13587,7 @@
           <p:cNvPr id="4" name="TextBox 3">
             <a:extLst>
               <a:ext uri="{FF2B5EF4-FFF2-40B4-BE49-F238E27FC236}">
-                <a16:creationId xmlns="" xmlns:a16="http://schemas.microsoft.com/office/drawing/2014/main" id="{4DEA915E-588A-F789-B5D4-C9B40994AB55}"/>
+                <a16:creationId xmlns:a16="http://schemas.microsoft.com/office/drawing/2014/main" xmlns="" id="{4DEA915E-588A-F789-B5D4-C9B40994AB55}"/>
               </a:ext>
             </a:extLst>
           </p:cNvPr>
@@ -13450,7 +13632,7 @@
           <p:cNvPr id="5" name="Picture 4">
             <a:extLst>
               <a:ext uri="{FF2B5EF4-FFF2-40B4-BE49-F238E27FC236}">
-                <a16:creationId xmlns="" xmlns:a16="http://schemas.microsoft.com/office/drawing/2014/main" id="{B4DAF1ED-860E-8CF4-BEF0-6A9130E4C529}"/>
+                <a16:creationId xmlns:a16="http://schemas.microsoft.com/office/drawing/2014/main" xmlns="" id="{B4DAF1ED-860E-8CF4-BEF0-6A9130E4C529}"/>
               </a:ext>
             </a:extLst>
           </p:cNvPr>
@@ -13477,7 +13659,7 @@
     </p:spTree>
     <p:extLst>
       <p:ext uri="{BB962C8B-B14F-4D97-AF65-F5344CB8AC3E}">
-        <p14:creationId xmlns="" xmlns:p14="http://schemas.microsoft.com/office/powerpoint/2010/main" val="1775174031"/>
+        <p14:creationId xmlns:p14="http://schemas.microsoft.com/office/powerpoint/2010/main" xmlns="" val="1775174031"/>
       </p:ext>
     </p:extLst>
   </p:cSld>
@@ -13637,7 +13819,7 @@
           <p:cNvPr id="4" name="Title 1">
             <a:extLst>
               <a:ext uri="{FF2B5EF4-FFF2-40B4-BE49-F238E27FC236}">
-                <a16:creationId xmlns="" xmlns:a16="http://schemas.microsoft.com/office/drawing/2014/main" id="{1547FEF1-34D8-4C55-A9D7-838C0CE83BD1}"/>
+                <a16:creationId xmlns:a16="http://schemas.microsoft.com/office/drawing/2014/main" xmlns="" id="{1547FEF1-34D8-4C55-A9D7-838C0CE83BD1}"/>
               </a:ext>
             </a:extLst>
           </p:cNvPr>
@@ -13693,7 +13875,7 @@
     </p:spTree>
     <p:extLst>
       <p:ext uri="{BB962C8B-B14F-4D97-AF65-F5344CB8AC3E}">
-        <p14:creationId xmlns="" xmlns:p14="http://schemas.microsoft.com/office/powerpoint/2010/main" val="893025881"/>
+        <p14:creationId xmlns:p14="http://schemas.microsoft.com/office/powerpoint/2010/main" xmlns="" val="893025881"/>
       </p:ext>
     </p:extLst>
   </p:cSld>
@@ -13768,7 +13950,7 @@
           <p:cNvPr id="24" name="Title 1">
             <a:extLst>
               <a:ext uri="{FF2B5EF4-FFF2-40B4-BE49-F238E27FC236}">
-                <a16:creationId xmlns="" xmlns:a16="http://schemas.microsoft.com/office/drawing/2014/main" id="{D0EEB7D9-347A-449E-98D8-2D25EE328AA4}"/>
+                <a16:creationId xmlns:a16="http://schemas.microsoft.com/office/drawing/2014/main" xmlns="" id="{D0EEB7D9-347A-449E-98D8-2D25EE328AA4}"/>
               </a:ext>
             </a:extLst>
           </p:cNvPr>
@@ -13826,7 +14008,7 @@
           <p:cNvPr id="68" name="TextBox 67">
             <a:extLst>
               <a:ext uri="{FF2B5EF4-FFF2-40B4-BE49-F238E27FC236}">
-                <a16:creationId xmlns="" xmlns:a16="http://schemas.microsoft.com/office/drawing/2014/main" id="{235E8D85-01A5-4229-BE39-57FC6AAA6D6E}"/>
+                <a16:creationId xmlns:a16="http://schemas.microsoft.com/office/drawing/2014/main" xmlns="" id="{235E8D85-01A5-4229-BE39-57FC6AAA6D6E}"/>
               </a:ext>
             </a:extLst>
           </p:cNvPr>
@@ -14012,7 +14194,7 @@
     </p:spTree>
     <p:extLst>
       <p:ext uri="{BB962C8B-B14F-4D97-AF65-F5344CB8AC3E}">
-        <p14:creationId xmlns="" xmlns:p14="http://schemas.microsoft.com/office/powerpoint/2010/main" val="497036884"/>
+        <p14:creationId xmlns:p14="http://schemas.microsoft.com/office/powerpoint/2010/main" xmlns="" val="497036884"/>
       </p:ext>
     </p:extLst>
   </p:cSld>
@@ -14087,7 +14269,7 @@
           <p:cNvPr id="24" name="Title 1">
             <a:extLst>
               <a:ext uri="{FF2B5EF4-FFF2-40B4-BE49-F238E27FC236}">
-                <a16:creationId xmlns="" xmlns:a16="http://schemas.microsoft.com/office/drawing/2014/main" id="{D0EEB7D9-347A-449E-98D8-2D25EE328AA4}"/>
+                <a16:creationId xmlns:a16="http://schemas.microsoft.com/office/drawing/2014/main" xmlns="" id="{D0EEB7D9-347A-449E-98D8-2D25EE328AA4}"/>
               </a:ext>
             </a:extLst>
           </p:cNvPr>
@@ -14145,7 +14327,7 @@
           <p:cNvPr id="68" name="TextBox 67">
             <a:extLst>
               <a:ext uri="{FF2B5EF4-FFF2-40B4-BE49-F238E27FC236}">
-                <a16:creationId xmlns="" xmlns:a16="http://schemas.microsoft.com/office/drawing/2014/main" id="{235E8D85-01A5-4229-BE39-57FC6AAA6D6E}"/>
+                <a16:creationId xmlns:a16="http://schemas.microsoft.com/office/drawing/2014/main" xmlns="" id="{235E8D85-01A5-4229-BE39-57FC6AAA6D6E}"/>
               </a:ext>
             </a:extLst>
           </p:cNvPr>
@@ -14320,7 +14502,7 @@
     </p:spTree>
     <p:extLst>
       <p:ext uri="{BB962C8B-B14F-4D97-AF65-F5344CB8AC3E}">
-        <p14:creationId xmlns="" xmlns:p14="http://schemas.microsoft.com/office/powerpoint/2010/main" val="3149828183"/>
+        <p14:creationId xmlns:p14="http://schemas.microsoft.com/office/powerpoint/2010/main" xmlns="" val="3149828183"/>
       </p:ext>
     </p:extLst>
   </p:cSld>
@@ -14362,7 +14544,7 @@
           <p:cNvPr id="4" name="Picture 3">
             <a:extLst>
               <a:ext uri="{FF2B5EF4-FFF2-40B4-BE49-F238E27FC236}">
-                <a16:creationId xmlns="" xmlns:a16="http://schemas.microsoft.com/office/drawing/2014/main" id="{7AD1F15A-C761-D2BE-0CAF-AE66D2E1EB8A}"/>
+                <a16:creationId xmlns:a16="http://schemas.microsoft.com/office/drawing/2014/main" xmlns="" id="{7AD1F15A-C761-D2BE-0CAF-AE66D2E1EB8A}"/>
               </a:ext>
             </a:extLst>
           </p:cNvPr>
@@ -14424,7 +14606,7 @@
           <p:cNvPr id="24" name="Title 1">
             <a:extLst>
               <a:ext uri="{FF2B5EF4-FFF2-40B4-BE49-F238E27FC236}">
-                <a16:creationId xmlns="" xmlns:a16="http://schemas.microsoft.com/office/drawing/2014/main" id="{D0EEB7D9-347A-449E-98D8-2D25EE328AA4}"/>
+                <a16:creationId xmlns:a16="http://schemas.microsoft.com/office/drawing/2014/main" xmlns="" id="{D0EEB7D9-347A-449E-98D8-2D25EE328AA4}"/>
               </a:ext>
             </a:extLst>
           </p:cNvPr>
@@ -14482,7 +14664,7 @@
           <p:cNvPr id="68" name="TextBox 67">
             <a:extLst>
               <a:ext uri="{FF2B5EF4-FFF2-40B4-BE49-F238E27FC236}">
-                <a16:creationId xmlns="" xmlns:a16="http://schemas.microsoft.com/office/drawing/2014/main" id="{235E8D85-01A5-4229-BE39-57FC6AAA6D6E}"/>
+                <a16:creationId xmlns:a16="http://schemas.microsoft.com/office/drawing/2014/main" xmlns="" id="{235E8D85-01A5-4229-BE39-57FC6AAA6D6E}"/>
               </a:ext>
             </a:extLst>
           </p:cNvPr>
@@ -14515,7 +14697,7 @@
     </p:spTree>
     <p:extLst>
       <p:ext uri="{BB962C8B-B14F-4D97-AF65-F5344CB8AC3E}">
-        <p14:creationId xmlns="" xmlns:p14="http://schemas.microsoft.com/office/powerpoint/2010/main" val="3546843722"/>
+        <p14:creationId xmlns:p14="http://schemas.microsoft.com/office/powerpoint/2010/main" xmlns="" val="3546843722"/>
       </p:ext>
     </p:extLst>
   </p:cSld>
@@ -14590,7 +14772,7 @@
           <p:cNvPr id="24" name="Title 1">
             <a:extLst>
               <a:ext uri="{FF2B5EF4-FFF2-40B4-BE49-F238E27FC236}">
-                <a16:creationId xmlns="" xmlns:a16="http://schemas.microsoft.com/office/drawing/2014/main" id="{D0EEB7D9-347A-449E-98D8-2D25EE328AA4}"/>
+                <a16:creationId xmlns:a16="http://schemas.microsoft.com/office/drawing/2014/main" xmlns="" id="{D0EEB7D9-347A-449E-98D8-2D25EE328AA4}"/>
               </a:ext>
             </a:extLst>
           </p:cNvPr>
@@ -14648,7 +14830,7 @@
           <p:cNvPr id="68" name="TextBox 67">
             <a:extLst>
               <a:ext uri="{FF2B5EF4-FFF2-40B4-BE49-F238E27FC236}">
-                <a16:creationId xmlns="" xmlns:a16="http://schemas.microsoft.com/office/drawing/2014/main" id="{235E8D85-01A5-4229-BE39-57FC6AAA6D6E}"/>
+                <a16:creationId xmlns:a16="http://schemas.microsoft.com/office/drawing/2014/main" xmlns="" id="{235E8D85-01A5-4229-BE39-57FC6AAA6D6E}"/>
               </a:ext>
             </a:extLst>
           </p:cNvPr>
@@ -14766,7 +14948,7 @@
           <p:nvPr/>
         </p:nvGraphicFramePr>
         <p:xfrm>
-          <a:off x="4538868" y="2193235"/>
+          <a:off x="6327911" y="2193235"/>
           <a:ext cx="3810001" cy="2140225"/>
         </p:xfrm>
         <a:graphic>
@@ -14782,7 +14964,7 @@
           <p:nvPr/>
         </p:nvGraphicFramePr>
         <p:xfrm>
-          <a:off x="3187148" y="4267201"/>
+          <a:off x="4366592" y="4280454"/>
           <a:ext cx="2816087" cy="1411356"/>
         </p:xfrm>
         <a:graphic>
@@ -14794,7 +14976,7 @@
     </p:spTree>
     <p:extLst>
       <p:ext uri="{BB962C8B-B14F-4D97-AF65-F5344CB8AC3E}">
-        <p14:creationId xmlns="" xmlns:p14="http://schemas.microsoft.com/office/powerpoint/2010/main" val="2554190940"/>
+        <p14:creationId xmlns:p14="http://schemas.microsoft.com/office/powerpoint/2010/main" xmlns="" val="2554190940"/>
       </p:ext>
     </p:extLst>
   </p:cSld>
@@ -14869,7 +15051,7 @@
           <p:cNvPr id="24" name="Title 1">
             <a:extLst>
               <a:ext uri="{FF2B5EF4-FFF2-40B4-BE49-F238E27FC236}">
-                <a16:creationId xmlns="" xmlns:a16="http://schemas.microsoft.com/office/drawing/2014/main" id="{D0EEB7D9-347A-449E-98D8-2D25EE328AA4}"/>
+                <a16:creationId xmlns:a16="http://schemas.microsoft.com/office/drawing/2014/main" xmlns="" id="{D0EEB7D9-347A-449E-98D8-2D25EE328AA4}"/>
               </a:ext>
             </a:extLst>
           </p:cNvPr>
@@ -14927,7 +15109,7 @@
           <p:cNvPr id="68" name="TextBox 67">
             <a:extLst>
               <a:ext uri="{FF2B5EF4-FFF2-40B4-BE49-F238E27FC236}">
-                <a16:creationId xmlns="" xmlns:a16="http://schemas.microsoft.com/office/drawing/2014/main" id="{235E8D85-01A5-4229-BE39-57FC6AAA6D6E}"/>
+                <a16:creationId xmlns:a16="http://schemas.microsoft.com/office/drawing/2014/main" xmlns="" id="{235E8D85-01A5-4229-BE39-57FC6AAA6D6E}"/>
               </a:ext>
             </a:extLst>
           </p:cNvPr>
@@ -15105,7 +15287,7 @@
     </p:spTree>
     <p:extLst>
       <p:ext uri="{BB962C8B-B14F-4D97-AF65-F5344CB8AC3E}">
-        <p14:creationId xmlns="" xmlns:p14="http://schemas.microsoft.com/office/powerpoint/2010/main" val="1359239756"/>
+        <p14:creationId xmlns:p14="http://schemas.microsoft.com/office/powerpoint/2010/main" xmlns="" val="1359239756"/>
       </p:ext>
     </p:extLst>
   </p:cSld>
@@ -15180,7 +15362,7 @@
           <p:cNvPr id="24" name="Title 1">
             <a:extLst>
               <a:ext uri="{FF2B5EF4-FFF2-40B4-BE49-F238E27FC236}">
-                <a16:creationId xmlns="" xmlns:a16="http://schemas.microsoft.com/office/drawing/2014/main" id="{D0EEB7D9-347A-449E-98D8-2D25EE328AA4}"/>
+                <a16:creationId xmlns:a16="http://schemas.microsoft.com/office/drawing/2014/main" xmlns="" id="{D0EEB7D9-347A-449E-98D8-2D25EE328AA4}"/>
               </a:ext>
             </a:extLst>
           </p:cNvPr>
@@ -15238,7 +15420,7 @@
           <p:cNvPr id="68" name="TextBox 67">
             <a:extLst>
               <a:ext uri="{FF2B5EF4-FFF2-40B4-BE49-F238E27FC236}">
-                <a16:creationId xmlns="" xmlns:a16="http://schemas.microsoft.com/office/drawing/2014/main" id="{235E8D85-01A5-4229-BE39-57FC6AAA6D6E}"/>
+                <a16:creationId xmlns:a16="http://schemas.microsoft.com/office/drawing/2014/main" xmlns="" id="{235E8D85-01A5-4229-BE39-57FC6AAA6D6E}"/>
               </a:ext>
             </a:extLst>
           </p:cNvPr>
@@ -15345,7 +15527,7 @@
           <p:cNvPr id="4" name="Picture 3">
             <a:extLst>
               <a:ext uri="{FF2B5EF4-FFF2-40B4-BE49-F238E27FC236}">
-                <a16:creationId xmlns="" xmlns:a16="http://schemas.microsoft.com/office/drawing/2014/main" id="{890C8F06-587E-EAC7-C36A-D5CDE60948DF}"/>
+                <a16:creationId xmlns:a16="http://schemas.microsoft.com/office/drawing/2014/main" xmlns="" id="{890C8F06-587E-EAC7-C36A-D5CDE60948DF}"/>
               </a:ext>
             </a:extLst>
           </p:cNvPr>
@@ -15375,7 +15557,7 @@
           <p:cNvPr id="6" name="Picture 5">
             <a:extLst>
               <a:ext uri="{FF2B5EF4-FFF2-40B4-BE49-F238E27FC236}">
-                <a16:creationId xmlns="" xmlns:a16="http://schemas.microsoft.com/office/drawing/2014/main" id="{59DBA2F8-C241-15D2-F032-F8C8F2C675B3}"/>
+                <a16:creationId xmlns:a16="http://schemas.microsoft.com/office/drawing/2014/main" xmlns="" id="{59DBA2F8-C241-15D2-F032-F8C8F2C675B3}"/>
               </a:ext>
             </a:extLst>
           </p:cNvPr>
@@ -15403,7 +15585,7 @@
     </p:spTree>
     <p:extLst>
       <p:ext uri="{BB962C8B-B14F-4D97-AF65-F5344CB8AC3E}">
-        <p14:creationId xmlns="" xmlns:p14="http://schemas.microsoft.com/office/powerpoint/2010/main" val="3582412639"/>
+        <p14:creationId xmlns:p14="http://schemas.microsoft.com/office/powerpoint/2010/main" xmlns="" val="3582412639"/>
       </p:ext>
     </p:extLst>
   </p:cSld>
@@ -15478,7 +15660,7 @@
           <p:cNvPr id="24" name="Title 1">
             <a:extLst>
               <a:ext uri="{FF2B5EF4-FFF2-40B4-BE49-F238E27FC236}">
-                <a16:creationId xmlns="" xmlns:a16="http://schemas.microsoft.com/office/drawing/2014/main" id="{D0EEB7D9-347A-449E-98D8-2D25EE328AA4}"/>
+                <a16:creationId xmlns:a16="http://schemas.microsoft.com/office/drawing/2014/main" xmlns="" id="{D0EEB7D9-347A-449E-98D8-2D25EE328AA4}"/>
               </a:ext>
             </a:extLst>
           </p:cNvPr>
@@ -15562,7 +15744,7 @@
     </p:spTree>
     <p:extLst>
       <p:ext uri="{BB962C8B-B14F-4D97-AF65-F5344CB8AC3E}">
-        <p14:creationId xmlns="" xmlns:p14="http://schemas.microsoft.com/office/powerpoint/2010/main" val="432898488"/>
+        <p14:creationId xmlns:p14="http://schemas.microsoft.com/office/powerpoint/2010/main" xmlns="" val="432898488"/>
       </p:ext>
     </p:extLst>
   </p:cSld>
@@ -15784,7 +15966,7 @@
           <p:cNvPr id="5" name="Title 1">
             <a:extLst>
               <a:ext uri="{FF2B5EF4-FFF2-40B4-BE49-F238E27FC236}">
-                <a16:creationId xmlns="" xmlns:a16="http://schemas.microsoft.com/office/drawing/2014/main" id="{D0EEB7D9-347A-449E-98D8-2D25EE328AA4}"/>
+                <a16:creationId xmlns:a16="http://schemas.microsoft.com/office/drawing/2014/main" xmlns="" id="{D0EEB7D9-347A-449E-98D8-2D25EE328AA4}"/>
               </a:ext>
             </a:extLst>
           </p:cNvPr>
@@ -16241,7 +16423,7 @@
   <a:extraClrSchemeLst/>
   <a:extLst>
     <a:ext uri="{05A4C25C-085E-4340-85A3-A5531E510DB2}">
-      <thm15:themeFamily xmlns="" xmlns:thm15="http://schemas.microsoft.com/office/thememl/2012/main" name="Office Theme" id="{62F939B6-93AF-4DB8-9C6B-D6C7DFDC589F}" vid="{4A3C46E8-61CC-4603-A589-7422A47A8E4A}"/>
+      <thm15:themeFamily xmlns:thm15="http://schemas.microsoft.com/office/thememl/2012/main" xmlns="" name="Office Theme" id="{62F939B6-93AF-4DB8-9C6B-D6C7DFDC589F}" vid="{4A3C46E8-61CC-4603-A589-7422A47A8E4A}"/>
     </a:ext>
   </a:extLst>
 </a:theme>
@@ -16502,7 +16684,7 @@
   <a:extraClrSchemeLst/>
   <a:extLst>
     <a:ext uri="{05A4C25C-085E-4340-85A3-A5531E510DB2}">
-      <thm15:themeFamily xmlns="" xmlns:thm15="http://schemas.microsoft.com/office/thememl/2012/main" name="Office Theme" id="{62F939B6-93AF-4DB8-9C6B-D6C7DFDC589F}" vid="{4A3C46E8-61CC-4603-A589-7422A47A8E4A}"/>
+      <thm15:themeFamily xmlns:thm15="http://schemas.microsoft.com/office/thememl/2012/main" xmlns="" name="Office Theme" id="{62F939B6-93AF-4DB8-9C6B-D6C7DFDC589F}" vid="{4A3C46E8-61CC-4603-A589-7422A47A8E4A}"/>
     </a:ext>
   </a:extLst>
 </a:theme>
@@ -16797,13 +16979,31 @@
   <a:extraClrSchemeLst/>
   <a:extLst>
     <a:ext uri="{05A4C25C-085E-4340-85A3-A5531E510DB2}">
-      <thm15:themeFamily xmlns="" xmlns:thm15="http://schemas.microsoft.com/office/thememl/2012/main" name="Office Theme" id="{62F939B6-93AF-4DB8-9C6B-D6C7DFDC589F}" vid="{4A3C46E8-61CC-4603-A589-7422A47A8E4A}"/>
+      <thm15:themeFamily xmlns:thm15="http://schemas.microsoft.com/office/thememl/2012/main" xmlns="" name="Office Theme" id="{62F939B6-93AF-4DB8-9C6B-D6C7DFDC589F}" vid="{4A3C46E8-61CC-4603-A589-7422A47A8E4A}"/>
     </a:ext>
   </a:extLst>
 </a:theme>
 </file>
 
 <file path=customXml/item1.xml><?xml version="1.0" encoding="utf-8"?>
+<p:properties xmlns:p="http://schemas.microsoft.com/office/2006/metadata/properties" xmlns:xsi="http://www.w3.org/2001/XMLSchema-instance" xmlns:pc="http://schemas.microsoft.com/office/infopath/2007/PartnerControls">
+  <documentManagement>
+    <Status xmlns="71af3243-3dd4-4a8d-8c0d-dd76da1f02a5">Not started</Status>
+    <MediaServiceKeyPoints xmlns="71af3243-3dd4-4a8d-8c0d-dd76da1f02a5" xsi:nil="true"/>
+  </documentManagement>
+</p:properties>
+</file>
+
+<file path=customXml/item2.xml><?xml version="1.0" encoding="utf-8"?>
+<?mso-contentType ?>
+<FormTemplates xmlns="http://schemas.microsoft.com/sharepoint/v3/contenttype/forms">
+  <Display>DocumentLibraryForm</Display>
+  <Edit>DocumentLibraryForm</Edit>
+  <New>DocumentLibraryForm</New>
+</FormTemplates>
+</file>
+
+<file path=customXml/item3.xml><?xml version="1.0" encoding="utf-8"?>
 <ct:contentTypeSchema xmlns:ct="http://schemas.microsoft.com/office/2006/metadata/contentType" xmlns:ma="http://schemas.microsoft.com/office/2006/metadata/properties/metaAttributes" ct:_="" ma:_="" ma:contentTypeName="Document" ma:contentTypeID="0x01010079F111ED35F8CC479449609E8A0923A6" ma:contentTypeVersion="12" ma:contentTypeDescription="Create a new document." ma:contentTypeScope="" ma:versionID="a8a52e8c320b9a064ae3583ae3861c92">
   <xsd:schema xmlns:xsd="http://www.w3.org/2001/XMLSchema" xmlns:xs="http://www.w3.org/2001/XMLSchema" xmlns:p="http://schemas.microsoft.com/office/2006/metadata/properties" xmlns:ns2="71af3243-3dd4-4a8d-8c0d-dd76da1f02a5" xmlns:ns3="16c05727-aa75-4e4a-9b5f-8a80a1165891" targetNamespace="http://schemas.microsoft.com/office/2006/metadata/properties" ma:root="true" ma:fieldsID="88020cb39231a0945110f9cd888b521a" ns2:_="" ns3:_="">
     <xsd:import namespace="71af3243-3dd4-4a8d-8c0d-dd76da1f02a5"/>
@@ -17024,25 +17224,25 @@
 </ct:contentTypeSchema>
 </file>
 
-<file path=customXml/item2.xml><?xml version="1.0" encoding="utf-8"?>
-<?mso-contentType ?>
-<FormTemplates xmlns="http://schemas.microsoft.com/sharepoint/v3/contenttype/forms">
-  <Display>DocumentLibraryForm</Display>
-  <Edit>DocumentLibraryForm</Edit>
-  <New>DocumentLibraryForm</New>
-</FormTemplates>
+<file path=customXml/itemProps1.xml><?xml version="1.0" encoding="utf-8"?>
+<ds:datastoreItem xmlns:ds="http://schemas.openxmlformats.org/officeDocument/2006/customXml" ds:itemID="{950072C5-DDE0-4258-BA7A-4D4B80DFA632}">
+  <ds:schemaRefs>
+    <ds:schemaRef ds:uri="http://schemas.microsoft.com/office/2006/metadata/properties"/>
+    <ds:schemaRef ds:uri="http://schemas.microsoft.com/office/infopath/2007/PartnerControls"/>
+    <ds:schemaRef ds:uri="71af3243-3dd4-4a8d-8c0d-dd76da1f02a5"/>
+  </ds:schemaRefs>
+</ds:datastoreItem>
 </file>
 
-<file path=customXml/item3.xml><?xml version="1.0" encoding="utf-8"?>
-<p:properties xmlns:p="http://schemas.microsoft.com/office/2006/metadata/properties" xmlns:xsi="http://www.w3.org/2001/XMLSchema-instance" xmlns:pc="http://schemas.microsoft.com/office/infopath/2007/PartnerControls">
-  <documentManagement>
-    <Status xmlns="71af3243-3dd4-4a8d-8c0d-dd76da1f02a5">Not started</Status>
-    <MediaServiceKeyPoints xmlns="71af3243-3dd4-4a8d-8c0d-dd76da1f02a5" xsi:nil="true"/>
-  </documentManagement>
-</p:properties>
+<file path=customXml/itemProps2.xml><?xml version="1.0" encoding="utf-8"?>
+<ds:datastoreItem xmlns:ds="http://schemas.openxmlformats.org/officeDocument/2006/customXml" ds:itemID="{7EE8C63A-4744-4DE4-BB49-0FF0B5375C60}">
+  <ds:schemaRefs>
+    <ds:schemaRef ds:uri="http://schemas.microsoft.com/sharepoint/v3/contenttype/forms"/>
+  </ds:schemaRefs>
+</ds:datastoreItem>
 </file>
 
-<file path=customXml/itemProps1.xml><?xml version="1.0" encoding="utf-8"?>
+<file path=customXml/itemProps3.xml><?xml version="1.0" encoding="utf-8"?>
 <ds:datastoreItem xmlns:ds="http://schemas.openxmlformats.org/officeDocument/2006/customXml" ds:itemID="{FD7FC771-7DFE-49DA-B577-71181BFBCB2E}">
   <ds:schemaRefs>
     <ds:schemaRef ds:uri="http://schemas.microsoft.com/office/2006/metadata/contentType"/>
@@ -17059,22 +17259,4 @@
     <ds:schemaRef ds:uri="http://schemas.microsoft.com/internal/obd"/>
   </ds:schemaRefs>
 </ds:datastoreItem>
-</file>
-
-<file path=customXml/itemProps2.xml><?xml version="1.0" encoding="utf-8"?>
-<ds:datastoreItem xmlns:ds="http://schemas.openxmlformats.org/officeDocument/2006/customXml" ds:itemID="{7EE8C63A-4744-4DE4-BB49-0FF0B5375C60}">
-  <ds:schemaRefs>
-    <ds:schemaRef ds:uri="http://schemas.microsoft.com/sharepoint/v3/contenttype/forms"/>
-  </ds:schemaRefs>
-</ds:datastoreItem>
-</file>
-
-<file path=customXml/itemProps3.xml><?xml version="1.0" encoding="utf-8"?>
-<ds:datastoreItem xmlns:ds="http://schemas.openxmlformats.org/officeDocument/2006/customXml" ds:itemID="{950072C5-DDE0-4258-BA7A-4D4B80DFA632}">
-  <ds:schemaRefs>
-    <ds:schemaRef ds:uri="http://schemas.microsoft.com/office/2006/metadata/properties"/>
-    <ds:schemaRef ds:uri="http://schemas.microsoft.com/office/infopath/2007/PartnerControls"/>
-    <ds:schemaRef ds:uri="71af3243-3dd4-4a8d-8c0d-dd76da1f02a5"/>
-  </ds:schemaRefs>
-</ds:datastoreItem>
 </file>
</xml_diff>